<commit_message>
add glossary term and diagram
</commit_message>
<xml_diff>
--- a/2024-01-11-Intro-to-Durable-Functions/Introduction-to-durable-functions.pptx
+++ b/2024-01-11-Intro-to-Durable-Functions/Introduction-to-durable-functions.pptx
@@ -5,10 +5,10 @@
     <p:sldMasterId id="2147483648" r:id="rId4"/>
   </p:sldMasterIdLst>
   <p:notesMasterIdLst>
-    <p:notesMasterId r:id="rId17"/>
+    <p:notesMasterId r:id="rId18"/>
   </p:notesMasterIdLst>
   <p:handoutMasterIdLst>
-    <p:handoutMasterId r:id="rId18"/>
+    <p:handoutMasterId r:id="rId19"/>
   </p:handoutMasterIdLst>
   <p:sldIdLst>
     <p:sldId id="2448" r:id="rId5"/>
@@ -16,13 +16,14 @@
     <p:sldId id="259" r:id="rId7"/>
     <p:sldId id="2468" r:id="rId8"/>
     <p:sldId id="2463" r:id="rId9"/>
-    <p:sldId id="2464" r:id="rId10"/>
-    <p:sldId id="2451" r:id="rId11"/>
-    <p:sldId id="2465" r:id="rId12"/>
-    <p:sldId id="2466" r:id="rId13"/>
-    <p:sldId id="2467" r:id="rId14"/>
-    <p:sldId id="2456" r:id="rId15"/>
-    <p:sldId id="2436" r:id="rId16"/>
+    <p:sldId id="2469" r:id="rId10"/>
+    <p:sldId id="2464" r:id="rId11"/>
+    <p:sldId id="2451" r:id="rId12"/>
+    <p:sldId id="2465" r:id="rId13"/>
+    <p:sldId id="2466" r:id="rId14"/>
+    <p:sldId id="2467" r:id="rId15"/>
+    <p:sldId id="2456" r:id="rId16"/>
+    <p:sldId id="2436" r:id="rId17"/>
   </p:sldIdLst>
   <p:sldSz cx="12192000" cy="6858000"/>
   <p:notesSz cx="6858000" cy="9144000"/>
@@ -242,7 +243,7 @@
           <a:p>
             <a:fld id="{966D5B4E-BF3E-3B45-A4BA-D6C3B92870D7}" type="datetimeFigureOut">
               <a:rPr lang="en-US" smtClean="0"/>
-              <a:t>1/8/2024</a:t>
+              <a:t>1/11/2024</a:t>
             </a:fld>
             <a:endParaRPr lang="en-US" dirty="0"/>
           </a:p>
@@ -419,7 +420,7 @@
           <a:p>
             <a:fld id="{F5A8621B-8C8E-49BA-8772-41D0FE75A082}" type="datetimeFigureOut">
               <a:rPr lang="en-US" smtClean="0"/>
-              <a:t>1/8/2024</a:t>
+              <a:t>1/11/2024</a:t>
             </a:fld>
             <a:endParaRPr lang="en-US" dirty="0"/>
           </a:p>
@@ -1012,7 +1013,7 @@
     </p:spTree>
     <p:extLst>
       <p:ext uri="{BB962C8B-B14F-4D97-AF65-F5344CB8AC3E}">
-        <p14:creationId xmlns:p14="http://schemas.microsoft.com/office/powerpoint/2010/main" val="1042599596"/>
+        <p14:creationId xmlns:p14="http://schemas.microsoft.com/office/powerpoint/2010/main" val="3348868023"/>
       </p:ext>
     </p:extLst>
   </p:cSld>
@@ -1087,7 +1088,7 @@
           <a:p>
             <a:fld id="{228B34ED-4CDD-41C9-90F7-D768D5559A6F}" type="slidenum">
               <a:rPr lang="en-US" smtClean="0"/>
-              <a:t>10</a:t>
+              <a:t>7</a:t>
             </a:fld>
             <a:endParaRPr lang="en-US" dirty="0"/>
           </a:p>
@@ -1096,7 +1097,7 @@
     </p:spTree>
     <p:extLst>
       <p:ext uri="{BB962C8B-B14F-4D97-AF65-F5344CB8AC3E}">
-        <p14:creationId xmlns:p14="http://schemas.microsoft.com/office/powerpoint/2010/main" val="3588235598"/>
+        <p14:creationId xmlns:p14="http://schemas.microsoft.com/office/powerpoint/2010/main" val="1042599596"/>
       </p:ext>
     </p:extLst>
   </p:cSld>
@@ -1172,6 +1173,90 @@
             <a:fld id="{228B34ED-4CDD-41C9-90F7-D768D5559A6F}" type="slidenum">
               <a:rPr lang="en-US" smtClean="0"/>
               <a:t>11</a:t>
+            </a:fld>
+            <a:endParaRPr lang="en-US" dirty="0"/>
+          </a:p>
+        </p:txBody>
+      </p:sp>
+    </p:spTree>
+    <p:extLst>
+      <p:ext uri="{BB962C8B-B14F-4D97-AF65-F5344CB8AC3E}">
+        <p14:creationId xmlns:p14="http://schemas.microsoft.com/office/powerpoint/2010/main" val="3588235598"/>
+      </p:ext>
+    </p:extLst>
+  </p:cSld>
+  <p:clrMapOvr>
+    <a:masterClrMapping/>
+  </p:clrMapOvr>
+</p:notes>
+</file>
+
+<file path=ppt/notesSlides/notesSlide7.xml><?xml version="1.0" encoding="utf-8"?>
+<p:notes xmlns:a="http://schemas.openxmlformats.org/drawingml/2006/main" xmlns:r="http://schemas.openxmlformats.org/officeDocument/2006/relationships" xmlns:p="http://schemas.openxmlformats.org/presentationml/2006/main">
+  <p:cSld>
+    <p:spTree>
+      <p:nvGrpSpPr>
+        <p:cNvPr id="1" name=""/>
+        <p:cNvGrpSpPr/>
+        <p:nvPr/>
+      </p:nvGrpSpPr>
+      <p:grpSpPr>
+        <a:xfrm>
+          <a:off x="0" y="0"/>
+          <a:ext cx="0" cy="0"/>
+          <a:chOff x="0" y="0"/>
+          <a:chExt cx="0" cy="0"/>
+        </a:xfrm>
+      </p:grpSpPr>
+      <p:sp>
+        <p:nvSpPr>
+          <p:cNvPr id="2" name="Slide Image Placeholder 1"/>
+          <p:cNvSpPr>
+            <a:spLocks noGrp="1" noRot="1" noChangeAspect="1"/>
+          </p:cNvSpPr>
+          <p:nvPr>
+            <p:ph type="sldImg"/>
+          </p:nvPr>
+        </p:nvSpPr>
+        <p:spPr/>
+      </p:sp>
+      <p:sp>
+        <p:nvSpPr>
+          <p:cNvPr id="3" name="Notes Placeholder 2"/>
+          <p:cNvSpPr>
+            <a:spLocks noGrp="1"/>
+          </p:cNvSpPr>
+          <p:nvPr>
+            <p:ph type="body" idx="1"/>
+          </p:nvPr>
+        </p:nvSpPr>
+        <p:spPr/>
+        <p:txBody>
+          <a:bodyPr/>
+          <a:lstStyle/>
+          <a:p>
+            <a:endParaRPr lang="en-US" dirty="0"/>
+          </a:p>
+        </p:txBody>
+      </p:sp>
+      <p:sp>
+        <p:nvSpPr>
+          <p:cNvPr id="4" name="Slide Number Placeholder 3"/>
+          <p:cNvSpPr>
+            <a:spLocks noGrp="1"/>
+          </p:cNvSpPr>
+          <p:nvPr>
+            <p:ph type="sldNum" sz="quarter" idx="5"/>
+          </p:nvPr>
+        </p:nvSpPr>
+        <p:spPr/>
+        <p:txBody>
+          <a:bodyPr/>
+          <a:lstStyle/>
+          <a:p>
+            <a:fld id="{228B34ED-4CDD-41C9-90F7-D768D5559A6F}" type="slidenum">
+              <a:rPr lang="en-US" smtClean="0"/>
+              <a:t>12</a:t>
             </a:fld>
             <a:endParaRPr lang="en-US" dirty="0"/>
           </a:p>
@@ -5833,10 +5918,10 @@
       </p:grpSpPr>
       <p:pic>
         <p:nvPicPr>
-          <p:cNvPr id="12" name="Picture 4">
-            <a:extLst>
-              <a:ext uri="{FF2B5EF4-FFF2-40B4-BE49-F238E27FC236}">
-                <a16:creationId xmlns:a16="http://schemas.microsoft.com/office/drawing/2014/main" id="{D51FC426-3431-2E5B-DA9B-8B7F83F88E4E}"/>
+          <p:cNvPr id="9" name="Picture 4">
+            <a:extLst>
+              <a:ext uri="{FF2B5EF4-FFF2-40B4-BE49-F238E27FC236}">
+                <a16:creationId xmlns:a16="http://schemas.microsoft.com/office/drawing/2014/main" id="{4188B036-918C-171B-7998-5C2188B0B47E}"/>
               </a:ext>
             </a:extLst>
           </p:cNvPr>
@@ -5846,7 +5931,7 @@
           <p:nvPr/>
         </p:nvPicPr>
         <p:blipFill>
-          <a:blip r:embed="rId3">
+          <a:blip r:embed="rId2">
             <a:extLst>
               <a:ext uri="{28A0092B-C50C-407E-A947-70E740481C1C}">
                 <a14:useLocalDpi xmlns:a14="http://schemas.microsoft.com/office/drawing/2010/main" val="0"/>
@@ -5880,6 +5965,240 @@
       </p:pic>
       <p:sp>
         <p:nvSpPr>
+          <p:cNvPr id="3" name="Title 2">
+            <a:extLst>
+              <a:ext uri="{FF2B5EF4-FFF2-40B4-BE49-F238E27FC236}">
+                <a16:creationId xmlns:a16="http://schemas.microsoft.com/office/drawing/2014/main" id="{1D24B42B-925B-494C-A986-BD85E8117E1E}"/>
+              </a:ext>
+            </a:extLst>
+          </p:cNvPr>
+          <p:cNvSpPr>
+            <a:spLocks noGrp="1"/>
+          </p:cNvSpPr>
+          <p:nvPr>
+            <p:ph type="title"/>
+          </p:nvPr>
+        </p:nvSpPr>
+        <p:spPr>
+          <a:xfrm>
+            <a:off x="5673035" y="1760530"/>
+            <a:ext cx="6299200" cy="3731529"/>
+          </a:xfrm>
+        </p:spPr>
+        <p:txBody>
+          <a:bodyPr>
+            <a:normAutofit/>
+          </a:bodyPr>
+          <a:lstStyle/>
+          <a:p>
+            <a:r>
+              <a:rPr lang="en-US" dirty="0">
+                <a:solidFill>
+                  <a:schemeClr val="bg1"/>
+                </a:solidFill>
+              </a:rPr>
+              <a:t>FAN OUT/FAN IN</a:t>
+            </a:r>
+            <a:br>
+              <a:rPr lang="en-US" dirty="0"/>
+            </a:br>
+            <a:br>
+              <a:rPr lang="en-US" dirty="0"/>
+            </a:br>
+            <a:endParaRPr lang="en-US" dirty="0"/>
+          </a:p>
+        </p:txBody>
+      </p:sp>
+      <p:sp>
+        <p:nvSpPr>
+          <p:cNvPr id="6" name="Slide Number Placeholder 5">
+            <a:extLst>
+              <a:ext uri="{FF2B5EF4-FFF2-40B4-BE49-F238E27FC236}">
+                <a16:creationId xmlns:a16="http://schemas.microsoft.com/office/drawing/2014/main" id="{FC6A5C12-E784-444E-B868-DE2AE85742BB}"/>
+              </a:ext>
+            </a:extLst>
+          </p:cNvPr>
+          <p:cNvSpPr>
+            <a:spLocks noGrp="1"/>
+          </p:cNvSpPr>
+          <p:nvPr>
+            <p:ph type="sldNum" sz="quarter" idx="12"/>
+          </p:nvPr>
+        </p:nvSpPr>
+        <p:spPr/>
+        <p:txBody>
+          <a:bodyPr/>
+          <a:lstStyle/>
+          <a:p>
+            <a:fld id="{8C2E478F-E849-4A8C-AF1F-CBCC78A7CBFA}" type="slidenum">
+              <a:rPr lang="en-US" smtClean="0"/>
+              <a:t>10</a:t>
+            </a:fld>
+            <a:endParaRPr lang="en-US" dirty="0"/>
+          </a:p>
+        </p:txBody>
+      </p:sp>
+      <p:pic>
+        <p:nvPicPr>
+          <p:cNvPr id="8" name="Picture Placeholder 7" descr="close up of computer code">
+            <a:extLst>
+              <a:ext uri="{FF2B5EF4-FFF2-40B4-BE49-F238E27FC236}">
+                <a16:creationId xmlns:a16="http://schemas.microsoft.com/office/drawing/2014/main" id="{A596BF19-CC58-4709-B5D6-3FC378FDC7BA}"/>
+              </a:ext>
+            </a:extLst>
+          </p:cNvPr>
+          <p:cNvPicPr>
+            <a:picLocks noGrp="1" noChangeAspect="1"/>
+          </p:cNvPicPr>
+          <p:nvPr>
+            <p:ph type="pic" sz="quarter" idx="13"/>
+          </p:nvPr>
+        </p:nvPicPr>
+        <p:blipFill rotWithShape="1">
+          <a:blip r:embed="rId3">
+            <a:extLst>
+              <a:ext uri="{BEBA8EAE-BF5A-486C-A8C5-ECC9F3942E4B}">
+                <a14:imgProps xmlns:a14="http://schemas.microsoft.com/office/drawing/2010/main">
+                  <a14:imgLayer r:embed="rId4">
+                    <a14:imgEffect>
+                      <a14:saturation sat="0"/>
+                    </a14:imgEffect>
+                  </a14:imgLayer>
+                </a14:imgProps>
+              </a:ext>
+            </a:extLst>
+          </a:blip>
+          <a:srcRect l="20370" r="20370"/>
+          <a:stretch/>
+        </p:blipFill>
+        <p:spPr/>
+      </p:pic>
+      <p:pic>
+        <p:nvPicPr>
+          <p:cNvPr id="8194" name="Picture 2" descr="A diagram of the fan out/fan pattern">
+            <a:extLst>
+              <a:ext uri="{FF2B5EF4-FFF2-40B4-BE49-F238E27FC236}">
+                <a16:creationId xmlns:a16="http://schemas.microsoft.com/office/drawing/2014/main" id="{918FF539-AA14-884E-44ED-48ED3C352A43}"/>
+              </a:ext>
+            </a:extLst>
+          </p:cNvPr>
+          <p:cNvPicPr>
+            <a:picLocks noChangeAspect="1" noChangeArrowheads="1"/>
+          </p:cNvPicPr>
+          <p:nvPr/>
+        </p:nvPicPr>
+        <p:blipFill>
+          <a:blip r:embed="rId5">
+            <a:extLst>
+              <a:ext uri="{28A0092B-C50C-407E-A947-70E740481C1C}">
+                <a14:useLocalDpi xmlns:a14="http://schemas.microsoft.com/office/drawing/2010/main" val="0"/>
+              </a:ext>
+            </a:extLst>
+          </a:blip>
+          <a:srcRect/>
+          <a:stretch>
+            <a:fillRect/>
+          </a:stretch>
+        </p:blipFill>
+        <p:spPr bwMode="auto">
+          <a:xfrm>
+            <a:off x="5466398" y="4017113"/>
+            <a:ext cx="5495925" cy="2724150"/>
+          </a:xfrm>
+          <a:prstGeom prst="rect">
+            <a:avLst/>
+          </a:prstGeom>
+          <a:noFill/>
+          <a:extLst>
+            <a:ext uri="{909E8E84-426E-40DD-AFC4-6F175D3DCCD1}">
+              <a14:hiddenFill xmlns:a14="http://schemas.microsoft.com/office/drawing/2010/main">
+                <a:solidFill>
+                  <a:srgbClr val="FFFFFF"/>
+                </a:solidFill>
+              </a14:hiddenFill>
+            </a:ext>
+          </a:extLst>
+        </p:spPr>
+      </p:pic>
+    </p:spTree>
+    <p:extLst>
+      <p:ext uri="{BB962C8B-B14F-4D97-AF65-F5344CB8AC3E}">
+        <p14:creationId xmlns:p14="http://schemas.microsoft.com/office/powerpoint/2010/main" val="1987547302"/>
+      </p:ext>
+    </p:extLst>
+  </p:cSld>
+  <p:clrMapOvr>
+    <a:masterClrMapping/>
+  </p:clrMapOvr>
+</p:sld>
+</file>
+
+<file path=ppt/slides/slide11.xml><?xml version="1.0" encoding="utf-8"?>
+<p:sld xmlns:a="http://schemas.openxmlformats.org/drawingml/2006/main" xmlns:r="http://schemas.openxmlformats.org/officeDocument/2006/relationships" xmlns:p="http://schemas.openxmlformats.org/presentationml/2006/main">
+  <p:cSld>
+    <p:spTree>
+      <p:nvGrpSpPr>
+        <p:cNvPr id="1" name=""/>
+        <p:cNvGrpSpPr/>
+        <p:nvPr/>
+      </p:nvGrpSpPr>
+      <p:grpSpPr>
+        <a:xfrm>
+          <a:off x="0" y="0"/>
+          <a:ext cx="0" cy="0"/>
+          <a:chOff x="0" y="0"/>
+          <a:chExt cx="0" cy="0"/>
+        </a:xfrm>
+      </p:grpSpPr>
+      <p:pic>
+        <p:nvPicPr>
+          <p:cNvPr id="12" name="Picture 4">
+            <a:extLst>
+              <a:ext uri="{FF2B5EF4-FFF2-40B4-BE49-F238E27FC236}">
+                <a16:creationId xmlns:a16="http://schemas.microsoft.com/office/drawing/2014/main" id="{D51FC426-3431-2E5B-DA9B-8B7F83F88E4E}"/>
+              </a:ext>
+            </a:extLst>
+          </p:cNvPr>
+          <p:cNvPicPr>
+            <a:picLocks noChangeAspect="1" noChangeArrowheads="1"/>
+          </p:cNvPicPr>
+          <p:nvPr/>
+        </p:nvPicPr>
+        <p:blipFill>
+          <a:blip r:embed="rId3">
+            <a:extLst>
+              <a:ext uri="{28A0092B-C50C-407E-A947-70E740481C1C}">
+                <a14:useLocalDpi xmlns:a14="http://schemas.microsoft.com/office/drawing/2010/main" val="0"/>
+              </a:ext>
+            </a:extLst>
+          </a:blip>
+          <a:srcRect/>
+          <a:stretch>
+            <a:fillRect/>
+          </a:stretch>
+        </p:blipFill>
+        <p:spPr bwMode="auto">
+          <a:xfrm>
+            <a:off x="-1" y="-330200"/>
+            <a:ext cx="15196735" cy="4220655"/>
+          </a:xfrm>
+          <a:prstGeom prst="rect">
+            <a:avLst/>
+          </a:prstGeom>
+          <a:noFill/>
+          <a:extLst>
+            <a:ext uri="{909E8E84-426E-40DD-AFC4-6F175D3DCCD1}">
+              <a14:hiddenFill xmlns:a14="http://schemas.microsoft.com/office/drawing/2010/main">
+                <a:solidFill>
+                  <a:srgbClr val="FFFFFF"/>
+                </a:solidFill>
+              </a14:hiddenFill>
+            </a:ext>
+          </a:extLst>
+        </p:spPr>
+      </p:pic>
+      <p:sp>
+        <p:nvSpPr>
           <p:cNvPr id="8" name="Title 7">
             <a:extLst>
               <a:ext uri="{FF2B5EF4-FFF2-40B4-BE49-F238E27FC236}">
@@ -5978,7 +6297,7 @@
           <a:p>
             <a:fld id="{8C2E478F-E849-4A8C-AF1F-CBCC78A7CBFA}" type="slidenum">
               <a:rPr lang="en-US" smtClean="0"/>
-              <a:t>10</a:t>
+              <a:t>11</a:t>
             </a:fld>
             <a:endParaRPr lang="en-US" dirty="0"/>
           </a:p>
@@ -6560,7 +6879,7 @@
 </p:sld>
 </file>
 
-<file path=ppt/slides/slide11.xml><?xml version="1.0" encoding="utf-8"?>
+<file path=ppt/slides/slide12.xml><?xml version="1.0" encoding="utf-8"?>
 <p:sld xmlns:a="http://schemas.openxmlformats.org/drawingml/2006/main" xmlns:r="http://schemas.openxmlformats.org/officeDocument/2006/relationships" xmlns:p="http://schemas.openxmlformats.org/presentationml/2006/main">
   <p:cSld>
     <p:spTree>
@@ -7054,7 +7373,7 @@
           <a:p>
             <a:fld id="{8C2E478F-E849-4A8C-AF1F-CBCC78A7CBFA}" type="slidenum">
               <a:rPr lang="en-US" smtClean="0"/>
-              <a:t>11</a:t>
+              <a:t>12</a:t>
             </a:fld>
             <a:endParaRPr lang="en-US" dirty="0"/>
           </a:p>
@@ -7073,7 +7392,7 @@
 </p:sld>
 </file>
 
-<file path=ppt/slides/slide12.xml><?xml version="1.0" encoding="utf-8"?>
+<file path=ppt/slides/slide13.xml><?xml version="1.0" encoding="utf-8"?>
 <p:sld xmlns:a="http://schemas.openxmlformats.org/drawingml/2006/main" xmlns:r="http://schemas.openxmlformats.org/officeDocument/2006/relationships" xmlns:p="http://schemas.openxmlformats.org/presentationml/2006/main">
   <p:cSld>
     <p:bg>
@@ -8411,7 +8730,7 @@
         </p:blipFill>
         <p:spPr bwMode="auto">
           <a:xfrm>
-            <a:off x="-1" y="-330200"/>
+            <a:off x="0" y="-330200"/>
             <a:ext cx="15196735" cy="4220655"/>
           </a:xfrm>
           <a:prstGeom prst="rect">
@@ -8524,13 +8843,13 @@
         </p:nvSpPr>
         <p:spPr>
           <a:xfrm>
-            <a:off x="5842000" y="2840257"/>
-            <a:ext cx="4646246" cy="3159223"/>
+            <a:off x="5828999" y="3048272"/>
+            <a:ext cx="4646246" cy="3473870"/>
           </a:xfrm>
         </p:spPr>
         <p:txBody>
           <a:bodyPr>
-            <a:normAutofit/>
+            <a:normAutofit fontScale="92500" lnSpcReduction="20000"/>
           </a:bodyPr>
           <a:lstStyle/>
           <a:p>
@@ -8564,6 +8883,33 @@
                 <a:cs typeface="Biome Light" panose="020B0303030204020804" pitchFamily="34" charset="0"/>
               </a:rPr>
               <a:t>Always returns the result if given the same inputs</a:t>
+            </a:r>
+          </a:p>
+          <a:p>
+            <a:pPr marL="0" indent="0">
+              <a:lnSpc>
+                <a:spcPct val="100000"/>
+              </a:lnSpc>
+              <a:buNone/>
+            </a:pPr>
+            <a:r>
+              <a:rPr lang="en-US" sz="1800" dirty="0">
+                <a:cs typeface="Biome Light" panose="020B0303030204020804" pitchFamily="34" charset="0"/>
+              </a:rPr>
+              <a:t>CLIENT</a:t>
+            </a:r>
+          </a:p>
+          <a:p>
+            <a:pPr>
+              <a:lnSpc>
+                <a:spcPct val="100000"/>
+              </a:lnSpc>
+            </a:pPr>
+            <a:r>
+              <a:rPr lang="en-US" sz="1800" dirty="0">
+                <a:cs typeface="Biome Light" panose="020B0303030204020804" pitchFamily="34" charset="0"/>
+              </a:rPr>
+              <a:t>Starts or sends commands to orchestrator - START</a:t>
             </a:r>
           </a:p>
           <a:p>
@@ -8749,7 +9095,7 @@
         </p:blipFill>
         <p:spPr bwMode="auto">
           <a:xfrm>
-            <a:off x="-1" y="-330200"/>
+            <a:off x="0" y="-330200"/>
             <a:ext cx="15196735" cy="4220655"/>
           </a:xfrm>
           <a:prstGeom prst="rect">
@@ -8902,499 +9248,52 @@
           <a:lstStyle/>
           <a:p>
             <a:r>
-              <a:rPr lang="en-US" dirty="0">
+              <a:rPr lang="en-US">
                 <a:solidFill>
                   <a:schemeClr val="bg1"/>
                 </a:solidFill>
               </a:rPr>
-              <a:t>Example Orchestration</a:t>
-            </a:r>
-          </a:p>
-        </p:txBody>
-      </p:sp>
-      <p:sp>
-        <p:nvSpPr>
-          <p:cNvPr id="7" name="Oval 6">
-            <a:extLst>
-              <a:ext uri="{FF2B5EF4-FFF2-40B4-BE49-F238E27FC236}">
-                <a16:creationId xmlns:a16="http://schemas.microsoft.com/office/drawing/2014/main" id="{281C3990-3C33-560D-2452-938D972309C9}"/>
-              </a:ext>
-            </a:extLst>
-          </p:cNvPr>
-          <p:cNvSpPr/>
-          <p:nvPr/>
-        </p:nvSpPr>
-        <p:spPr>
-          <a:xfrm>
-            <a:off x="5750560" y="2508544"/>
-            <a:ext cx="1884680" cy="1103335"/>
-          </a:xfrm>
-          <a:prstGeom prst="ellipse">
-            <a:avLst/>
-          </a:prstGeom>
-        </p:spPr>
-        <p:style>
-          <a:lnRef idx="2">
-            <a:schemeClr val="accent1">
-              <a:shade val="15000"/>
-            </a:schemeClr>
-          </a:lnRef>
-          <a:fillRef idx="1">
-            <a:schemeClr val="accent1"/>
-          </a:fillRef>
-          <a:effectRef idx="0">
-            <a:schemeClr val="accent1"/>
-          </a:effectRef>
-          <a:fontRef idx="minor">
-            <a:schemeClr val="lt1"/>
-          </a:fontRef>
-        </p:style>
-        <p:txBody>
-          <a:bodyPr rtlCol="0" anchor="ctr"/>
+              <a:t>Flow Diagram</a:t>
+            </a:r>
+            <a:endParaRPr lang="en-US" dirty="0">
+              <a:solidFill>
+                <a:schemeClr val="bg1"/>
+              </a:solidFill>
+            </a:endParaRPr>
+          </a:p>
+        </p:txBody>
+      </p:sp>
+      <p:sp>
+        <p:nvSpPr>
+          <p:cNvPr id="3" name="Content Placeholder 2">
+            <a:extLst>
+              <a:ext uri="{FF2B5EF4-FFF2-40B4-BE49-F238E27FC236}">
+                <a16:creationId xmlns:a16="http://schemas.microsoft.com/office/drawing/2014/main" id="{55BFDCFB-8DB8-64FF-EFA7-3A1D78AC60DB}"/>
+              </a:ext>
+            </a:extLst>
+          </p:cNvPr>
+          <p:cNvSpPr>
+            <a:spLocks noGrp="1"/>
+          </p:cNvSpPr>
+          <p:nvPr>
+            <p:ph idx="1"/>
+          </p:nvPr>
+        </p:nvSpPr>
+        <p:spPr/>
+        <p:txBody>
+          <a:bodyPr/>
           <a:lstStyle/>
           <a:p>
-            <a:pPr algn="ctr"/>
-            <a:r>
-              <a:rPr lang="en-US" dirty="0"/>
-              <a:t>Customer Places Pizza Order</a:t>
-            </a:r>
-          </a:p>
-        </p:txBody>
-      </p:sp>
-      <p:sp>
-        <p:nvSpPr>
-          <p:cNvPr id="10" name="Rectangle 9">
-            <a:extLst>
-              <a:ext uri="{FF2B5EF4-FFF2-40B4-BE49-F238E27FC236}">
-                <a16:creationId xmlns:a16="http://schemas.microsoft.com/office/drawing/2014/main" id="{9949F67E-4A72-5F8B-4AE8-843EB013926F}"/>
-              </a:ext>
-            </a:extLst>
-          </p:cNvPr>
-          <p:cNvSpPr/>
-          <p:nvPr/>
-        </p:nvSpPr>
-        <p:spPr>
-          <a:xfrm>
-            <a:off x="6893560" y="4112793"/>
-            <a:ext cx="1676400" cy="743687"/>
-          </a:xfrm>
-          <a:prstGeom prst="rect">
-            <a:avLst/>
-          </a:prstGeom>
-        </p:spPr>
-        <p:style>
-          <a:lnRef idx="2">
-            <a:schemeClr val="accent1">
-              <a:shade val="15000"/>
-            </a:schemeClr>
-          </a:lnRef>
-          <a:fillRef idx="1">
-            <a:schemeClr val="accent1"/>
-          </a:fillRef>
-          <a:effectRef idx="0">
-            <a:schemeClr val="accent1"/>
-          </a:effectRef>
-          <a:fontRef idx="minor">
-            <a:schemeClr val="lt1"/>
-          </a:fontRef>
-        </p:style>
-        <p:txBody>
-          <a:bodyPr rtlCol="0" anchor="ctr"/>
-          <a:lstStyle/>
-          <a:p>
-            <a:pPr algn="ctr"/>
-            <a:r>
-              <a:rPr lang="en-US" dirty="0"/>
-              <a:t>Send Order to Store</a:t>
-            </a:r>
-          </a:p>
-        </p:txBody>
-      </p:sp>
-      <p:sp>
-        <p:nvSpPr>
-          <p:cNvPr id="11" name="Rectangle 10">
-            <a:extLst>
-              <a:ext uri="{FF2B5EF4-FFF2-40B4-BE49-F238E27FC236}">
-                <a16:creationId xmlns:a16="http://schemas.microsoft.com/office/drawing/2014/main" id="{3EAF83B1-055A-0B65-042C-0331D6026500}"/>
-              </a:ext>
-            </a:extLst>
-          </p:cNvPr>
-          <p:cNvSpPr/>
-          <p:nvPr/>
-        </p:nvSpPr>
-        <p:spPr>
-          <a:xfrm>
-            <a:off x="6893560" y="5076622"/>
-            <a:ext cx="1676400" cy="743687"/>
-          </a:xfrm>
-          <a:prstGeom prst="rect">
-            <a:avLst/>
-          </a:prstGeom>
-        </p:spPr>
-        <p:style>
-          <a:lnRef idx="2">
-            <a:schemeClr val="accent1">
-              <a:shade val="15000"/>
-            </a:schemeClr>
-          </a:lnRef>
-          <a:fillRef idx="1">
-            <a:schemeClr val="accent1"/>
-          </a:fillRef>
-          <a:effectRef idx="0">
-            <a:schemeClr val="accent1"/>
-          </a:effectRef>
-          <a:fontRef idx="minor">
-            <a:schemeClr val="lt1"/>
-          </a:fontRef>
-        </p:style>
-        <p:txBody>
-          <a:bodyPr rtlCol="0" anchor="ctr"/>
-          <a:lstStyle/>
-          <a:p>
-            <a:pPr algn="ctr"/>
-            <a:r>
-              <a:rPr lang="en-US" dirty="0"/>
-              <a:t>Wait for Pizza Made</a:t>
-            </a:r>
-          </a:p>
-        </p:txBody>
-      </p:sp>
-      <p:sp>
-        <p:nvSpPr>
-          <p:cNvPr id="13" name="Rectangle 12">
-            <a:extLst>
-              <a:ext uri="{FF2B5EF4-FFF2-40B4-BE49-F238E27FC236}">
-                <a16:creationId xmlns:a16="http://schemas.microsoft.com/office/drawing/2014/main" id="{98B90BB5-B2DF-C6C4-3CFB-6E3F88ABDDC7}"/>
-              </a:ext>
-            </a:extLst>
-          </p:cNvPr>
-          <p:cNvSpPr/>
-          <p:nvPr/>
-        </p:nvSpPr>
-        <p:spPr>
-          <a:xfrm>
-            <a:off x="6893560" y="6042647"/>
-            <a:ext cx="1676400" cy="743687"/>
-          </a:xfrm>
-          <a:prstGeom prst="rect">
-            <a:avLst/>
-          </a:prstGeom>
-        </p:spPr>
-        <p:style>
-          <a:lnRef idx="2">
-            <a:schemeClr val="accent1">
-              <a:shade val="15000"/>
-            </a:schemeClr>
-          </a:lnRef>
-          <a:fillRef idx="1">
-            <a:schemeClr val="accent1"/>
-          </a:fillRef>
-          <a:effectRef idx="0">
-            <a:schemeClr val="accent1"/>
-          </a:effectRef>
-          <a:fontRef idx="minor">
-            <a:schemeClr val="lt1"/>
-          </a:fontRef>
-        </p:style>
-        <p:txBody>
-          <a:bodyPr rtlCol="0" anchor="ctr"/>
-          <a:lstStyle/>
-          <a:p>
-            <a:pPr algn="ctr"/>
-            <a:r>
-              <a:rPr lang="en-US" dirty="0"/>
-              <a:t>Send Customer Notification</a:t>
-            </a:r>
+            <a:endParaRPr lang="en-US"/>
           </a:p>
         </p:txBody>
       </p:sp>
       <p:pic>
         <p:nvPicPr>
-          <p:cNvPr id="15" name="Graphic 14" descr="Chef male with solid fill">
-            <a:extLst>
-              <a:ext uri="{FF2B5EF4-FFF2-40B4-BE49-F238E27FC236}">
-                <a16:creationId xmlns:a16="http://schemas.microsoft.com/office/drawing/2014/main" id="{0194B278-EB30-F77E-1B2A-DA636A67EFEA}"/>
-              </a:ext>
-            </a:extLst>
-          </p:cNvPr>
-          <p:cNvPicPr>
-            <a:picLocks noChangeAspect="1"/>
-          </p:cNvPicPr>
-          <p:nvPr/>
-        </p:nvPicPr>
-        <p:blipFill>
-          <a:blip r:embed="rId6">
-            <a:extLst>
-              <a:ext uri="{96DAC541-7B7A-43D3-8B79-37D633B846F1}">
-                <asvg:svgBlip xmlns:asvg="http://schemas.microsoft.com/office/drawing/2016/SVG/main" r:embed="rId7"/>
-              </a:ext>
-            </a:extLst>
-          </a:blip>
-          <a:stretch>
-            <a:fillRect/>
-          </a:stretch>
-        </p:blipFill>
-        <p:spPr>
-          <a:xfrm>
-            <a:off x="10380869" y="4025825"/>
-            <a:ext cx="914400" cy="914400"/>
-          </a:xfrm>
-          <a:prstGeom prst="rect">
-            <a:avLst/>
-          </a:prstGeom>
-        </p:spPr>
-      </p:pic>
-      <p:sp>
-        <p:nvSpPr>
-          <p:cNvPr id="22" name="TextBox 21">
-            <a:extLst>
-              <a:ext uri="{FF2B5EF4-FFF2-40B4-BE49-F238E27FC236}">
-                <a16:creationId xmlns:a16="http://schemas.microsoft.com/office/drawing/2014/main" id="{71E33CF6-ABA1-8FC9-EE11-5638374C57BA}"/>
-              </a:ext>
-            </a:extLst>
-          </p:cNvPr>
-          <p:cNvSpPr txBox="1"/>
-          <p:nvPr/>
-        </p:nvSpPr>
-        <p:spPr>
-          <a:xfrm>
-            <a:off x="9098280" y="5395813"/>
-            <a:ext cx="1815369" cy="369332"/>
-          </a:xfrm>
-          <a:prstGeom prst="rect">
-            <a:avLst/>
-          </a:prstGeom>
-          <a:noFill/>
-        </p:spPr>
-        <p:txBody>
-          <a:bodyPr wrap="none" rtlCol="0">
-            <a:spAutoFit/>
-          </a:bodyPr>
-          <a:lstStyle/>
-          <a:p>
-            <a:r>
-              <a:rPr lang="en-US" dirty="0"/>
-              <a:t>Clicks Pizza Made</a:t>
-            </a:r>
-          </a:p>
-        </p:txBody>
-      </p:sp>
-      <p:cxnSp>
-        <p:nvCxnSpPr>
-          <p:cNvPr id="26" name="Connector: Elbow 25">
-            <a:extLst>
-              <a:ext uri="{FF2B5EF4-FFF2-40B4-BE49-F238E27FC236}">
-                <a16:creationId xmlns:a16="http://schemas.microsoft.com/office/drawing/2014/main" id="{8829843A-C1B0-C94B-2B10-66771B0E3BF7}"/>
-              </a:ext>
-            </a:extLst>
-          </p:cNvPr>
-          <p:cNvCxnSpPr>
-            <a:cxnSpLocks/>
-            <a:stCxn id="7" idx="4"/>
-            <a:endCxn id="10" idx="1"/>
-          </p:cNvCxnSpPr>
-          <p:nvPr/>
-        </p:nvCxnSpPr>
-        <p:spPr>
-          <a:xfrm rot="16200000" flipH="1">
-            <a:off x="6356851" y="3947928"/>
-            <a:ext cx="872758" cy="200660"/>
-          </a:xfrm>
-          <a:prstGeom prst="bentConnector2">
-            <a:avLst/>
-          </a:prstGeom>
-          <a:ln w="28575">
-            <a:tailEnd type="triangle"/>
-          </a:ln>
-        </p:spPr>
-        <p:style>
-          <a:lnRef idx="1">
-            <a:schemeClr val="accent1"/>
-          </a:lnRef>
-          <a:fillRef idx="0">
-            <a:schemeClr val="accent1"/>
-          </a:fillRef>
-          <a:effectRef idx="0">
-            <a:schemeClr val="accent1"/>
-          </a:effectRef>
-          <a:fontRef idx="minor">
-            <a:schemeClr val="tx1"/>
-          </a:fontRef>
-        </p:style>
-      </p:cxnSp>
-      <p:cxnSp>
-        <p:nvCxnSpPr>
-          <p:cNvPr id="33" name="Connector: Elbow 32">
-            <a:extLst>
-              <a:ext uri="{FF2B5EF4-FFF2-40B4-BE49-F238E27FC236}">
-                <a16:creationId xmlns:a16="http://schemas.microsoft.com/office/drawing/2014/main" id="{CF83FE70-17C6-1923-337B-2B974BCEE92E}"/>
-              </a:ext>
-            </a:extLst>
-          </p:cNvPr>
-          <p:cNvCxnSpPr>
-            <a:cxnSpLocks/>
-            <a:stCxn id="10" idx="3"/>
-          </p:cNvCxnSpPr>
-          <p:nvPr/>
-        </p:nvCxnSpPr>
-        <p:spPr>
-          <a:xfrm flipV="1">
-            <a:off x="8569960" y="4017333"/>
-            <a:ext cx="2268109" cy="467304"/>
-          </a:xfrm>
-          <a:prstGeom prst="bentConnector3">
-            <a:avLst>
-              <a:gd name="adj1" fmla="val 50000"/>
-            </a:avLst>
-          </a:prstGeom>
-          <a:ln w="28575">
-            <a:tailEnd type="triangle"/>
-          </a:ln>
-        </p:spPr>
-        <p:style>
-          <a:lnRef idx="1">
-            <a:schemeClr val="accent1"/>
-          </a:lnRef>
-          <a:fillRef idx="0">
-            <a:schemeClr val="accent1"/>
-          </a:fillRef>
-          <a:effectRef idx="0">
-            <a:schemeClr val="accent1"/>
-          </a:effectRef>
-          <a:fontRef idx="minor">
-            <a:schemeClr val="tx1"/>
-          </a:fontRef>
-        </p:style>
-      </p:cxnSp>
-      <p:cxnSp>
-        <p:nvCxnSpPr>
-          <p:cNvPr id="36" name="Connector: Elbow 35">
-            <a:extLst>
-              <a:ext uri="{FF2B5EF4-FFF2-40B4-BE49-F238E27FC236}">
-                <a16:creationId xmlns:a16="http://schemas.microsoft.com/office/drawing/2014/main" id="{7F64836B-EE0F-1D61-50B6-FC8F737566CD}"/>
-              </a:ext>
-            </a:extLst>
-          </p:cNvPr>
-          <p:cNvCxnSpPr>
-            <a:cxnSpLocks/>
-            <a:stCxn id="15" idx="2"/>
-            <a:endCxn id="11" idx="3"/>
-          </p:cNvCxnSpPr>
-          <p:nvPr/>
-        </p:nvCxnSpPr>
-        <p:spPr>
-          <a:xfrm rot="5400000">
-            <a:off x="9449895" y="4060291"/>
-            <a:ext cx="508241" cy="2268109"/>
-          </a:xfrm>
-          <a:prstGeom prst="bentConnector2">
-            <a:avLst/>
-          </a:prstGeom>
-          <a:ln w="28575">
-            <a:tailEnd type="triangle"/>
-          </a:ln>
-        </p:spPr>
-        <p:style>
-          <a:lnRef idx="1">
-            <a:schemeClr val="accent1"/>
-          </a:lnRef>
-          <a:fillRef idx="0">
-            <a:schemeClr val="accent1"/>
-          </a:fillRef>
-          <a:effectRef idx="0">
-            <a:schemeClr val="accent1"/>
-          </a:effectRef>
-          <a:fontRef idx="minor">
-            <a:schemeClr val="tx1"/>
-          </a:fontRef>
-        </p:style>
-      </p:cxnSp>
-      <p:cxnSp>
-        <p:nvCxnSpPr>
-          <p:cNvPr id="41" name="Connector: Elbow 40">
-            <a:extLst>
-              <a:ext uri="{FF2B5EF4-FFF2-40B4-BE49-F238E27FC236}">
-                <a16:creationId xmlns:a16="http://schemas.microsoft.com/office/drawing/2014/main" id="{B4FF0B41-E6A1-60C4-1142-FCD0F3D00159}"/>
-              </a:ext>
-            </a:extLst>
-          </p:cNvPr>
-          <p:cNvCxnSpPr>
-            <a:cxnSpLocks/>
-            <a:stCxn id="11" idx="2"/>
-            <a:endCxn id="13" idx="0"/>
-          </p:cNvCxnSpPr>
-          <p:nvPr/>
-        </p:nvCxnSpPr>
-        <p:spPr>
-          <a:xfrm rot="5400000">
-            <a:off x="7620591" y="5931478"/>
-            <a:ext cx="222338" cy="12700"/>
-          </a:xfrm>
-          <a:prstGeom prst="bentConnector3">
-            <a:avLst>
-              <a:gd name="adj1" fmla="val 50000"/>
-            </a:avLst>
-          </a:prstGeom>
-          <a:ln w="28575">
-            <a:tailEnd type="triangle"/>
-          </a:ln>
-        </p:spPr>
-        <p:style>
-          <a:lnRef idx="1">
-            <a:schemeClr val="accent1"/>
-          </a:lnRef>
-          <a:fillRef idx="0">
-            <a:schemeClr val="accent1"/>
-          </a:fillRef>
-          <a:effectRef idx="0">
-            <a:schemeClr val="accent1"/>
-          </a:effectRef>
-          <a:fontRef idx="minor">
-            <a:schemeClr val="tx1"/>
-          </a:fontRef>
-        </p:style>
-      </p:cxnSp>
-      <p:sp>
-        <p:nvSpPr>
-          <p:cNvPr id="44" name="TextBox 43">
-            <a:extLst>
-              <a:ext uri="{FF2B5EF4-FFF2-40B4-BE49-F238E27FC236}">
-                <a16:creationId xmlns:a16="http://schemas.microsoft.com/office/drawing/2014/main" id="{6AC151CC-5187-8977-9CB8-17EF7EE1997A}"/>
-              </a:ext>
-            </a:extLst>
-          </p:cNvPr>
-          <p:cNvSpPr txBox="1"/>
-          <p:nvPr/>
-        </p:nvSpPr>
-        <p:spPr>
-          <a:xfrm>
-            <a:off x="8620760" y="4517696"/>
-            <a:ext cx="1218539" cy="369332"/>
-          </a:xfrm>
-          <a:prstGeom prst="rect">
-            <a:avLst/>
-          </a:prstGeom>
-          <a:noFill/>
-        </p:spPr>
-        <p:txBody>
-          <a:bodyPr wrap="none" rtlCol="0">
-            <a:spAutoFit/>
-          </a:bodyPr>
-          <a:lstStyle/>
-          <a:p>
-            <a:r>
-              <a:rPr lang="en-US" dirty="0"/>
-              <a:t>Make Pizza</a:t>
-            </a:r>
-          </a:p>
-        </p:txBody>
-      </p:sp>
-      <p:pic>
-        <p:nvPicPr>
-          <p:cNvPr id="3074" name="Picture 2">
-            <a:extLst>
-              <a:ext uri="{FF2B5EF4-FFF2-40B4-BE49-F238E27FC236}">
-                <a16:creationId xmlns:a16="http://schemas.microsoft.com/office/drawing/2014/main" id="{CC34E186-7519-9F79-7839-F2EC906B981C}"/>
+          <p:cNvPr id="1026" name="Picture 2" descr="Durable Functions components">
+            <a:extLst>
+              <a:ext uri="{FF2B5EF4-FFF2-40B4-BE49-F238E27FC236}">
+                <a16:creationId xmlns:a16="http://schemas.microsoft.com/office/drawing/2014/main" id="{7E8893DC-EC09-1523-2C74-19B6C73306C1}"/>
               </a:ext>
             </a:extLst>
           </p:cNvPr>
@@ -9404,7 +9303,7 @@
           <p:nvPr/>
         </p:nvPicPr>
         <p:blipFill>
-          <a:blip r:embed="rId8">
+          <a:blip r:embed="rId6">
             <a:extLst>
               <a:ext uri="{28A0092B-C50C-407E-A947-70E740481C1C}">
                 <a14:useLocalDpi xmlns:a14="http://schemas.microsoft.com/office/drawing/2010/main" val="0"/>
@@ -9418,8 +9317,8 @@
         </p:blipFill>
         <p:spPr bwMode="auto">
           <a:xfrm>
-            <a:off x="11239500" y="3985328"/>
-            <a:ext cx="901700" cy="901700"/>
+            <a:off x="5433886" y="2626751"/>
+            <a:ext cx="6775450" cy="4225245"/>
           </a:xfrm>
           <a:prstGeom prst="rect">
             <a:avLst/>
@@ -9439,7 +9338,7 @@
     </p:spTree>
     <p:extLst>
       <p:ext uri="{BB962C8B-B14F-4D97-AF65-F5344CB8AC3E}">
-        <p14:creationId xmlns:p14="http://schemas.microsoft.com/office/powerpoint/2010/main" val="3385485801"/>
+        <p14:creationId xmlns:p14="http://schemas.microsoft.com/office/powerpoint/2010/main" val="4089780392"/>
       </p:ext>
     </p:extLst>
   </p:cSld>
@@ -9468,10 +9367,10 @@
       </p:grpSpPr>
       <p:pic>
         <p:nvPicPr>
-          <p:cNvPr id="9" name="Picture 4">
-            <a:extLst>
-              <a:ext uri="{FF2B5EF4-FFF2-40B4-BE49-F238E27FC236}">
-                <a16:creationId xmlns:a16="http://schemas.microsoft.com/office/drawing/2014/main" id="{4188B036-918C-171B-7998-5C2188B0B47E}"/>
+          <p:cNvPr id="12" name="Picture 4">
+            <a:extLst>
+              <a:ext uri="{FF2B5EF4-FFF2-40B4-BE49-F238E27FC236}">
+                <a16:creationId xmlns:a16="http://schemas.microsoft.com/office/drawing/2014/main" id="{D51FC426-3431-2E5B-DA9B-8B7F83F88E4E}"/>
               </a:ext>
             </a:extLst>
           </p:cNvPr>
@@ -9481,7 +9380,7 @@
           <p:nvPr/>
         </p:nvPicPr>
         <p:blipFill>
-          <a:blip r:embed="rId2">
+          <a:blip r:embed="rId3">
             <a:extLst>
               <a:ext uri="{28A0092B-C50C-407E-A947-70E740481C1C}">
                 <a14:useLocalDpi xmlns:a14="http://schemas.microsoft.com/office/drawing/2010/main" val="0"/>
@@ -9515,10 +9414,10 @@
       </p:pic>
       <p:sp>
         <p:nvSpPr>
-          <p:cNvPr id="3" name="Title 2">
-            <a:extLst>
-              <a:ext uri="{FF2B5EF4-FFF2-40B4-BE49-F238E27FC236}">
-                <a16:creationId xmlns:a16="http://schemas.microsoft.com/office/drawing/2014/main" id="{1D24B42B-925B-494C-A986-BD85E8117E1E}"/>
+          <p:cNvPr id="8" name="Title 7">
+            <a:extLst>
+              <a:ext uri="{FF2B5EF4-FFF2-40B4-BE49-F238E27FC236}">
+                <a16:creationId xmlns:a16="http://schemas.microsoft.com/office/drawing/2014/main" id="{103950CF-5BF2-4FB0-A36C-48C194F39E12}"/>
               </a:ext>
             </a:extLst>
           </p:cNvPr>
@@ -9531,14 +9430,12 @@
         </p:nvSpPr>
         <p:spPr>
           <a:xfrm>
-            <a:off x="5673035" y="2024690"/>
-            <a:ext cx="6299200" cy="3731529"/>
-          </a:xfrm>
-        </p:spPr>
-        <p:txBody>
-          <a:bodyPr>
-            <a:normAutofit/>
-          </a:bodyPr>
+            <a:off x="5534300" y="1150517"/>
+            <a:ext cx="5897218" cy="884238"/>
+          </a:xfrm>
+        </p:spPr>
+        <p:txBody>
+          <a:bodyPr/>
           <a:lstStyle/>
           <a:p>
             <a:r>
@@ -9547,32 +9444,65 @@
                   <a:schemeClr val="bg1"/>
                 </a:solidFill>
               </a:rPr>
-              <a:t>BUILDING </a:t>
-            </a:r>
-            <a:br>
-              <a:rPr lang="en-US" dirty="0"/>
-            </a:br>
-            <a:r>
-              <a:rPr lang="en-US" dirty="0"/>
-              <a:t>YOUR FIRST ORCHESTRATION</a:t>
-            </a:r>
-          </a:p>
-        </p:txBody>
-      </p:sp>
-      <p:sp>
-        <p:nvSpPr>
-          <p:cNvPr id="6" name="Slide Number Placeholder 5">
-            <a:extLst>
-              <a:ext uri="{FF2B5EF4-FFF2-40B4-BE49-F238E27FC236}">
-                <a16:creationId xmlns:a16="http://schemas.microsoft.com/office/drawing/2014/main" id="{FC6A5C12-E784-444E-B868-DE2AE85742BB}"/>
-              </a:ext>
-            </a:extLst>
-          </p:cNvPr>
-          <p:cNvSpPr>
-            <a:spLocks noGrp="1"/>
-          </p:cNvSpPr>
-          <p:nvPr>
-            <p:ph type="sldNum" sz="quarter" idx="12"/>
+              <a:t>INTRODUCTION</a:t>
+            </a:r>
+          </a:p>
+        </p:txBody>
+      </p:sp>
+      <p:pic>
+        <p:nvPicPr>
+          <p:cNvPr id="5" name="Picture Placeholder 4" descr="table with various people working on their laptops">
+            <a:extLst>
+              <a:ext uri="{FF2B5EF4-FFF2-40B4-BE49-F238E27FC236}">
+                <a16:creationId xmlns:a16="http://schemas.microsoft.com/office/drawing/2014/main" id="{A0280051-D7F1-4438-B815-F0FF4906D141}"/>
+              </a:ext>
+            </a:extLst>
+          </p:cNvPr>
+          <p:cNvPicPr>
+            <a:picLocks noGrp="1" noChangeAspect="1"/>
+          </p:cNvPicPr>
+          <p:nvPr>
+            <p:ph type="pic" sz="quarter" idx="14"/>
+          </p:nvPr>
+        </p:nvPicPr>
+        <p:blipFill rotWithShape="1">
+          <a:blip r:embed="rId4" cstate="email">
+            <a:extLst>
+              <a:ext uri="{BEBA8EAE-BF5A-486C-A8C5-ECC9F3942E4B}">
+                <a14:imgProps xmlns:a14="http://schemas.microsoft.com/office/drawing/2010/main">
+                  <a14:imgLayer r:embed="rId5">
+                    <a14:imgEffect>
+                      <a14:saturation sat="0"/>
+                    </a14:imgEffect>
+                  </a14:imgLayer>
+                </a14:imgProps>
+              </a:ext>
+              <a:ext uri="{28A0092B-C50C-407E-A947-70E740481C1C}">
+                <a14:useLocalDpi xmlns:a14="http://schemas.microsoft.com/office/drawing/2010/main"/>
+              </a:ext>
+            </a:extLst>
+          </a:blip>
+          <a:srcRect l="23617" r="23617"/>
+          <a:stretch/>
+        </p:blipFill>
+        <p:spPr>
+          <a:noFill/>
+        </p:spPr>
+      </p:pic>
+      <p:sp>
+        <p:nvSpPr>
+          <p:cNvPr id="4" name="Slide Number Placeholder 3">
+            <a:extLst>
+              <a:ext uri="{FF2B5EF4-FFF2-40B4-BE49-F238E27FC236}">
+                <a16:creationId xmlns:a16="http://schemas.microsoft.com/office/drawing/2014/main" id="{A4BADA18-8F0E-4249-A144-6CB8259BA65B}"/>
+              </a:ext>
+            </a:extLst>
+          </p:cNvPr>
+          <p:cNvSpPr>
+            <a:spLocks noGrp="1"/>
+          </p:cNvSpPr>
+          <p:nvPr>
+            <p:ph type="sldNum" sz="quarter" idx="4"/>
           </p:nvPr>
         </p:nvSpPr>
         <p:spPr/>
@@ -9588,45 +9518,573 @@
           </a:p>
         </p:txBody>
       </p:sp>
+      <p:sp>
+        <p:nvSpPr>
+          <p:cNvPr id="6" name="TextBox 5">
+            <a:extLst>
+              <a:ext uri="{FF2B5EF4-FFF2-40B4-BE49-F238E27FC236}">
+                <a16:creationId xmlns:a16="http://schemas.microsoft.com/office/drawing/2014/main" id="{40836CCE-2BC6-106A-0987-EB308801D680}"/>
+              </a:ext>
+            </a:extLst>
+          </p:cNvPr>
+          <p:cNvSpPr txBox="1"/>
+          <p:nvPr/>
+        </p:nvSpPr>
+        <p:spPr>
+          <a:xfrm>
+            <a:off x="5534935" y="1851875"/>
+            <a:ext cx="3870326" cy="369332"/>
+          </a:xfrm>
+          <a:prstGeom prst="rect">
+            <a:avLst/>
+          </a:prstGeom>
+          <a:noFill/>
+        </p:spPr>
+        <p:txBody>
+          <a:bodyPr wrap="square">
+            <a:spAutoFit/>
+          </a:bodyPr>
+          <a:lstStyle/>
+          <a:p>
+            <a:r>
+              <a:rPr lang="en-US" dirty="0">
+                <a:solidFill>
+                  <a:schemeClr val="bg1"/>
+                </a:solidFill>
+              </a:rPr>
+              <a:t>Example Orchestration</a:t>
+            </a:r>
+          </a:p>
+        </p:txBody>
+      </p:sp>
+      <p:sp>
+        <p:nvSpPr>
+          <p:cNvPr id="7" name="Oval 6">
+            <a:extLst>
+              <a:ext uri="{FF2B5EF4-FFF2-40B4-BE49-F238E27FC236}">
+                <a16:creationId xmlns:a16="http://schemas.microsoft.com/office/drawing/2014/main" id="{281C3990-3C33-560D-2452-938D972309C9}"/>
+              </a:ext>
+            </a:extLst>
+          </p:cNvPr>
+          <p:cNvSpPr/>
+          <p:nvPr/>
+        </p:nvSpPr>
+        <p:spPr>
+          <a:xfrm>
+            <a:off x="5750560" y="2508544"/>
+            <a:ext cx="1884680" cy="1103335"/>
+          </a:xfrm>
+          <a:prstGeom prst="ellipse">
+            <a:avLst/>
+          </a:prstGeom>
+        </p:spPr>
+        <p:style>
+          <a:lnRef idx="2">
+            <a:schemeClr val="accent1">
+              <a:shade val="15000"/>
+            </a:schemeClr>
+          </a:lnRef>
+          <a:fillRef idx="1">
+            <a:schemeClr val="accent1"/>
+          </a:fillRef>
+          <a:effectRef idx="0">
+            <a:schemeClr val="accent1"/>
+          </a:effectRef>
+          <a:fontRef idx="minor">
+            <a:schemeClr val="lt1"/>
+          </a:fontRef>
+        </p:style>
+        <p:txBody>
+          <a:bodyPr rtlCol="0" anchor="ctr"/>
+          <a:lstStyle/>
+          <a:p>
+            <a:pPr algn="ctr"/>
+            <a:r>
+              <a:rPr lang="en-US" dirty="0"/>
+              <a:t>Customer Places Pizza Order</a:t>
+            </a:r>
+          </a:p>
+        </p:txBody>
+      </p:sp>
+      <p:sp>
+        <p:nvSpPr>
+          <p:cNvPr id="10" name="Rectangle 9">
+            <a:extLst>
+              <a:ext uri="{FF2B5EF4-FFF2-40B4-BE49-F238E27FC236}">
+                <a16:creationId xmlns:a16="http://schemas.microsoft.com/office/drawing/2014/main" id="{9949F67E-4A72-5F8B-4AE8-843EB013926F}"/>
+              </a:ext>
+            </a:extLst>
+          </p:cNvPr>
+          <p:cNvSpPr/>
+          <p:nvPr/>
+        </p:nvSpPr>
+        <p:spPr>
+          <a:xfrm>
+            <a:off x="6893560" y="4112793"/>
+            <a:ext cx="1676400" cy="743687"/>
+          </a:xfrm>
+          <a:prstGeom prst="rect">
+            <a:avLst/>
+          </a:prstGeom>
+        </p:spPr>
+        <p:style>
+          <a:lnRef idx="2">
+            <a:schemeClr val="accent1">
+              <a:shade val="15000"/>
+            </a:schemeClr>
+          </a:lnRef>
+          <a:fillRef idx="1">
+            <a:schemeClr val="accent1"/>
+          </a:fillRef>
+          <a:effectRef idx="0">
+            <a:schemeClr val="accent1"/>
+          </a:effectRef>
+          <a:fontRef idx="minor">
+            <a:schemeClr val="lt1"/>
+          </a:fontRef>
+        </p:style>
+        <p:txBody>
+          <a:bodyPr rtlCol="0" anchor="ctr"/>
+          <a:lstStyle/>
+          <a:p>
+            <a:pPr algn="ctr"/>
+            <a:r>
+              <a:rPr lang="en-US" dirty="0"/>
+              <a:t>Send Order to Store</a:t>
+            </a:r>
+          </a:p>
+        </p:txBody>
+      </p:sp>
+      <p:sp>
+        <p:nvSpPr>
+          <p:cNvPr id="11" name="Rectangle 10">
+            <a:extLst>
+              <a:ext uri="{FF2B5EF4-FFF2-40B4-BE49-F238E27FC236}">
+                <a16:creationId xmlns:a16="http://schemas.microsoft.com/office/drawing/2014/main" id="{3EAF83B1-055A-0B65-042C-0331D6026500}"/>
+              </a:ext>
+            </a:extLst>
+          </p:cNvPr>
+          <p:cNvSpPr/>
+          <p:nvPr/>
+        </p:nvSpPr>
+        <p:spPr>
+          <a:xfrm>
+            <a:off x="6893560" y="5076622"/>
+            <a:ext cx="1676400" cy="743687"/>
+          </a:xfrm>
+          <a:prstGeom prst="rect">
+            <a:avLst/>
+          </a:prstGeom>
+        </p:spPr>
+        <p:style>
+          <a:lnRef idx="2">
+            <a:schemeClr val="accent1">
+              <a:shade val="15000"/>
+            </a:schemeClr>
+          </a:lnRef>
+          <a:fillRef idx="1">
+            <a:schemeClr val="accent1"/>
+          </a:fillRef>
+          <a:effectRef idx="0">
+            <a:schemeClr val="accent1"/>
+          </a:effectRef>
+          <a:fontRef idx="minor">
+            <a:schemeClr val="lt1"/>
+          </a:fontRef>
+        </p:style>
+        <p:txBody>
+          <a:bodyPr rtlCol="0" anchor="ctr"/>
+          <a:lstStyle/>
+          <a:p>
+            <a:pPr algn="ctr"/>
+            <a:r>
+              <a:rPr lang="en-US" dirty="0"/>
+              <a:t>Wait for Pizza Made</a:t>
+            </a:r>
+          </a:p>
+        </p:txBody>
+      </p:sp>
+      <p:sp>
+        <p:nvSpPr>
+          <p:cNvPr id="13" name="Rectangle 12">
+            <a:extLst>
+              <a:ext uri="{FF2B5EF4-FFF2-40B4-BE49-F238E27FC236}">
+                <a16:creationId xmlns:a16="http://schemas.microsoft.com/office/drawing/2014/main" id="{98B90BB5-B2DF-C6C4-3CFB-6E3F88ABDDC7}"/>
+              </a:ext>
+            </a:extLst>
+          </p:cNvPr>
+          <p:cNvSpPr/>
+          <p:nvPr/>
+        </p:nvSpPr>
+        <p:spPr>
+          <a:xfrm>
+            <a:off x="6893560" y="6042647"/>
+            <a:ext cx="1676400" cy="743687"/>
+          </a:xfrm>
+          <a:prstGeom prst="rect">
+            <a:avLst/>
+          </a:prstGeom>
+        </p:spPr>
+        <p:style>
+          <a:lnRef idx="2">
+            <a:schemeClr val="accent1">
+              <a:shade val="15000"/>
+            </a:schemeClr>
+          </a:lnRef>
+          <a:fillRef idx="1">
+            <a:schemeClr val="accent1"/>
+          </a:fillRef>
+          <a:effectRef idx="0">
+            <a:schemeClr val="accent1"/>
+          </a:effectRef>
+          <a:fontRef idx="minor">
+            <a:schemeClr val="lt1"/>
+          </a:fontRef>
+        </p:style>
+        <p:txBody>
+          <a:bodyPr rtlCol="0" anchor="ctr"/>
+          <a:lstStyle/>
+          <a:p>
+            <a:pPr algn="ctr"/>
+            <a:r>
+              <a:rPr lang="en-US" dirty="0"/>
+              <a:t>Send Customer Notification</a:t>
+            </a:r>
+          </a:p>
+        </p:txBody>
+      </p:sp>
       <p:pic>
         <p:nvPicPr>
-          <p:cNvPr id="8" name="Picture Placeholder 7" descr="close up of computer code">
-            <a:extLst>
-              <a:ext uri="{FF2B5EF4-FFF2-40B4-BE49-F238E27FC236}">
-                <a16:creationId xmlns:a16="http://schemas.microsoft.com/office/drawing/2014/main" id="{A596BF19-CC58-4709-B5D6-3FC378FDC7BA}"/>
+          <p:cNvPr id="15" name="Graphic 14" descr="Chef male with solid fill">
+            <a:extLst>
+              <a:ext uri="{FF2B5EF4-FFF2-40B4-BE49-F238E27FC236}">
+                <a16:creationId xmlns:a16="http://schemas.microsoft.com/office/drawing/2014/main" id="{0194B278-EB30-F77E-1B2A-DA636A67EFEA}"/>
               </a:ext>
             </a:extLst>
           </p:cNvPr>
           <p:cNvPicPr>
-            <a:picLocks noGrp="1" noChangeAspect="1"/>
+            <a:picLocks noChangeAspect="1"/>
           </p:cNvPicPr>
-          <p:nvPr>
-            <p:ph type="pic" sz="quarter" idx="13"/>
-          </p:nvPr>
+          <p:nvPr/>
         </p:nvPicPr>
-        <p:blipFill rotWithShape="1">
-          <a:blip r:embed="rId3">
-            <a:extLst>
-              <a:ext uri="{BEBA8EAE-BF5A-486C-A8C5-ECC9F3942E4B}">
-                <a14:imgProps xmlns:a14="http://schemas.microsoft.com/office/drawing/2010/main">
-                  <a14:imgLayer r:embed="rId4">
-                    <a14:imgEffect>
-                      <a14:saturation sat="0"/>
-                    </a14:imgEffect>
-                  </a14:imgLayer>
-                </a14:imgProps>
+        <p:blipFill>
+          <a:blip r:embed="rId6">
+            <a:extLst>
+              <a:ext uri="{96DAC541-7B7A-43D3-8B79-37D633B846F1}">
+                <asvg:svgBlip xmlns:asvg="http://schemas.microsoft.com/office/drawing/2016/SVG/main" r:embed="rId7"/>
               </a:ext>
             </a:extLst>
           </a:blip>
-          <a:srcRect l="20370" r="20370"/>
-          <a:stretch/>
+          <a:stretch>
+            <a:fillRect/>
+          </a:stretch>
         </p:blipFill>
-        <p:spPr/>
+        <p:spPr>
+          <a:xfrm>
+            <a:off x="10380869" y="4025825"/>
+            <a:ext cx="914400" cy="914400"/>
+          </a:xfrm>
+          <a:prstGeom prst="rect">
+            <a:avLst/>
+          </a:prstGeom>
+        </p:spPr>
+      </p:pic>
+      <p:sp>
+        <p:nvSpPr>
+          <p:cNvPr id="22" name="TextBox 21">
+            <a:extLst>
+              <a:ext uri="{FF2B5EF4-FFF2-40B4-BE49-F238E27FC236}">
+                <a16:creationId xmlns:a16="http://schemas.microsoft.com/office/drawing/2014/main" id="{71E33CF6-ABA1-8FC9-EE11-5638374C57BA}"/>
+              </a:ext>
+            </a:extLst>
+          </p:cNvPr>
+          <p:cNvSpPr txBox="1"/>
+          <p:nvPr/>
+        </p:nvSpPr>
+        <p:spPr>
+          <a:xfrm>
+            <a:off x="9098280" y="5395813"/>
+            <a:ext cx="1815369" cy="369332"/>
+          </a:xfrm>
+          <a:prstGeom prst="rect">
+            <a:avLst/>
+          </a:prstGeom>
+          <a:noFill/>
+        </p:spPr>
+        <p:txBody>
+          <a:bodyPr wrap="none" rtlCol="0">
+            <a:spAutoFit/>
+          </a:bodyPr>
+          <a:lstStyle/>
+          <a:p>
+            <a:r>
+              <a:rPr lang="en-US" dirty="0"/>
+              <a:t>Clicks Pizza Made</a:t>
+            </a:r>
+          </a:p>
+        </p:txBody>
+      </p:sp>
+      <p:cxnSp>
+        <p:nvCxnSpPr>
+          <p:cNvPr id="26" name="Connector: Elbow 25">
+            <a:extLst>
+              <a:ext uri="{FF2B5EF4-FFF2-40B4-BE49-F238E27FC236}">
+                <a16:creationId xmlns:a16="http://schemas.microsoft.com/office/drawing/2014/main" id="{8829843A-C1B0-C94B-2B10-66771B0E3BF7}"/>
+              </a:ext>
+            </a:extLst>
+          </p:cNvPr>
+          <p:cNvCxnSpPr>
+            <a:cxnSpLocks/>
+            <a:stCxn id="7" idx="4"/>
+            <a:endCxn id="10" idx="1"/>
+          </p:cNvCxnSpPr>
+          <p:nvPr/>
+        </p:nvCxnSpPr>
+        <p:spPr>
+          <a:xfrm rot="16200000" flipH="1">
+            <a:off x="6356851" y="3947928"/>
+            <a:ext cx="872758" cy="200660"/>
+          </a:xfrm>
+          <a:prstGeom prst="bentConnector2">
+            <a:avLst/>
+          </a:prstGeom>
+          <a:ln w="28575">
+            <a:tailEnd type="triangle"/>
+          </a:ln>
+        </p:spPr>
+        <p:style>
+          <a:lnRef idx="1">
+            <a:schemeClr val="accent1"/>
+          </a:lnRef>
+          <a:fillRef idx="0">
+            <a:schemeClr val="accent1"/>
+          </a:fillRef>
+          <a:effectRef idx="0">
+            <a:schemeClr val="accent1"/>
+          </a:effectRef>
+          <a:fontRef idx="minor">
+            <a:schemeClr val="tx1"/>
+          </a:fontRef>
+        </p:style>
+      </p:cxnSp>
+      <p:cxnSp>
+        <p:nvCxnSpPr>
+          <p:cNvPr id="33" name="Connector: Elbow 32">
+            <a:extLst>
+              <a:ext uri="{FF2B5EF4-FFF2-40B4-BE49-F238E27FC236}">
+                <a16:creationId xmlns:a16="http://schemas.microsoft.com/office/drawing/2014/main" id="{CF83FE70-17C6-1923-337B-2B974BCEE92E}"/>
+              </a:ext>
+            </a:extLst>
+          </p:cNvPr>
+          <p:cNvCxnSpPr>
+            <a:cxnSpLocks/>
+            <a:stCxn id="10" idx="3"/>
+          </p:cNvCxnSpPr>
+          <p:nvPr/>
+        </p:nvCxnSpPr>
+        <p:spPr>
+          <a:xfrm flipV="1">
+            <a:off x="8569960" y="4017333"/>
+            <a:ext cx="2268109" cy="467304"/>
+          </a:xfrm>
+          <a:prstGeom prst="bentConnector3">
+            <a:avLst>
+              <a:gd name="adj1" fmla="val 50000"/>
+            </a:avLst>
+          </a:prstGeom>
+          <a:ln w="28575">
+            <a:tailEnd type="triangle"/>
+          </a:ln>
+        </p:spPr>
+        <p:style>
+          <a:lnRef idx="1">
+            <a:schemeClr val="accent1"/>
+          </a:lnRef>
+          <a:fillRef idx="0">
+            <a:schemeClr val="accent1"/>
+          </a:fillRef>
+          <a:effectRef idx="0">
+            <a:schemeClr val="accent1"/>
+          </a:effectRef>
+          <a:fontRef idx="minor">
+            <a:schemeClr val="tx1"/>
+          </a:fontRef>
+        </p:style>
+      </p:cxnSp>
+      <p:cxnSp>
+        <p:nvCxnSpPr>
+          <p:cNvPr id="36" name="Connector: Elbow 35">
+            <a:extLst>
+              <a:ext uri="{FF2B5EF4-FFF2-40B4-BE49-F238E27FC236}">
+                <a16:creationId xmlns:a16="http://schemas.microsoft.com/office/drawing/2014/main" id="{7F64836B-EE0F-1D61-50B6-FC8F737566CD}"/>
+              </a:ext>
+            </a:extLst>
+          </p:cNvPr>
+          <p:cNvCxnSpPr>
+            <a:cxnSpLocks/>
+            <a:stCxn id="15" idx="2"/>
+            <a:endCxn id="11" idx="3"/>
+          </p:cNvCxnSpPr>
+          <p:nvPr/>
+        </p:nvCxnSpPr>
+        <p:spPr>
+          <a:xfrm rot="5400000">
+            <a:off x="9449895" y="4060291"/>
+            <a:ext cx="508241" cy="2268109"/>
+          </a:xfrm>
+          <a:prstGeom prst="bentConnector2">
+            <a:avLst/>
+          </a:prstGeom>
+          <a:ln w="28575">
+            <a:tailEnd type="triangle"/>
+          </a:ln>
+        </p:spPr>
+        <p:style>
+          <a:lnRef idx="1">
+            <a:schemeClr val="accent1"/>
+          </a:lnRef>
+          <a:fillRef idx="0">
+            <a:schemeClr val="accent1"/>
+          </a:fillRef>
+          <a:effectRef idx="0">
+            <a:schemeClr val="accent1"/>
+          </a:effectRef>
+          <a:fontRef idx="minor">
+            <a:schemeClr val="tx1"/>
+          </a:fontRef>
+        </p:style>
+      </p:cxnSp>
+      <p:cxnSp>
+        <p:nvCxnSpPr>
+          <p:cNvPr id="41" name="Connector: Elbow 40">
+            <a:extLst>
+              <a:ext uri="{FF2B5EF4-FFF2-40B4-BE49-F238E27FC236}">
+                <a16:creationId xmlns:a16="http://schemas.microsoft.com/office/drawing/2014/main" id="{B4FF0B41-E6A1-60C4-1142-FCD0F3D00159}"/>
+              </a:ext>
+            </a:extLst>
+          </p:cNvPr>
+          <p:cNvCxnSpPr>
+            <a:cxnSpLocks/>
+            <a:stCxn id="11" idx="2"/>
+            <a:endCxn id="13" idx="0"/>
+          </p:cNvCxnSpPr>
+          <p:nvPr/>
+        </p:nvCxnSpPr>
+        <p:spPr>
+          <a:xfrm rot="5400000">
+            <a:off x="7620591" y="5931478"/>
+            <a:ext cx="222338" cy="12700"/>
+          </a:xfrm>
+          <a:prstGeom prst="bentConnector3">
+            <a:avLst>
+              <a:gd name="adj1" fmla="val 50000"/>
+            </a:avLst>
+          </a:prstGeom>
+          <a:ln w="28575">
+            <a:tailEnd type="triangle"/>
+          </a:ln>
+        </p:spPr>
+        <p:style>
+          <a:lnRef idx="1">
+            <a:schemeClr val="accent1"/>
+          </a:lnRef>
+          <a:fillRef idx="0">
+            <a:schemeClr val="accent1"/>
+          </a:fillRef>
+          <a:effectRef idx="0">
+            <a:schemeClr val="accent1"/>
+          </a:effectRef>
+          <a:fontRef idx="minor">
+            <a:schemeClr val="tx1"/>
+          </a:fontRef>
+        </p:style>
+      </p:cxnSp>
+      <p:sp>
+        <p:nvSpPr>
+          <p:cNvPr id="44" name="TextBox 43">
+            <a:extLst>
+              <a:ext uri="{FF2B5EF4-FFF2-40B4-BE49-F238E27FC236}">
+                <a16:creationId xmlns:a16="http://schemas.microsoft.com/office/drawing/2014/main" id="{6AC151CC-5187-8977-9CB8-17EF7EE1997A}"/>
+              </a:ext>
+            </a:extLst>
+          </p:cNvPr>
+          <p:cNvSpPr txBox="1"/>
+          <p:nvPr/>
+        </p:nvSpPr>
+        <p:spPr>
+          <a:xfrm>
+            <a:off x="8620760" y="4517696"/>
+            <a:ext cx="1218539" cy="369332"/>
+          </a:xfrm>
+          <a:prstGeom prst="rect">
+            <a:avLst/>
+          </a:prstGeom>
+          <a:noFill/>
+        </p:spPr>
+        <p:txBody>
+          <a:bodyPr wrap="none" rtlCol="0">
+            <a:spAutoFit/>
+          </a:bodyPr>
+          <a:lstStyle/>
+          <a:p>
+            <a:r>
+              <a:rPr lang="en-US" dirty="0"/>
+              <a:t>Make Pizza</a:t>
+            </a:r>
+          </a:p>
+        </p:txBody>
+      </p:sp>
+      <p:pic>
+        <p:nvPicPr>
+          <p:cNvPr id="3074" name="Picture 2">
+            <a:extLst>
+              <a:ext uri="{FF2B5EF4-FFF2-40B4-BE49-F238E27FC236}">
+                <a16:creationId xmlns:a16="http://schemas.microsoft.com/office/drawing/2014/main" id="{CC34E186-7519-9F79-7839-F2EC906B981C}"/>
+              </a:ext>
+            </a:extLst>
+          </p:cNvPr>
+          <p:cNvPicPr>
+            <a:picLocks noChangeAspect="1" noChangeArrowheads="1"/>
+          </p:cNvPicPr>
+          <p:nvPr/>
+        </p:nvPicPr>
+        <p:blipFill>
+          <a:blip r:embed="rId8">
+            <a:extLst>
+              <a:ext uri="{28A0092B-C50C-407E-A947-70E740481C1C}">
+                <a14:useLocalDpi xmlns:a14="http://schemas.microsoft.com/office/drawing/2010/main" val="0"/>
+              </a:ext>
+            </a:extLst>
+          </a:blip>
+          <a:srcRect/>
+          <a:stretch>
+            <a:fillRect/>
+          </a:stretch>
+        </p:blipFill>
+        <p:spPr bwMode="auto">
+          <a:xfrm>
+            <a:off x="11239500" y="3985328"/>
+            <a:ext cx="901700" cy="901700"/>
+          </a:xfrm>
+          <a:prstGeom prst="rect">
+            <a:avLst/>
+          </a:prstGeom>
+          <a:noFill/>
+          <a:extLst>
+            <a:ext uri="{909E8E84-426E-40DD-AFC4-6F175D3DCCD1}">
+              <a14:hiddenFill xmlns:a14="http://schemas.microsoft.com/office/drawing/2010/main">
+                <a:solidFill>
+                  <a:srgbClr val="FFFFFF"/>
+                </a:solidFill>
+              </a14:hiddenFill>
+            </a:ext>
+          </a:extLst>
+        </p:spPr>
       </p:pic>
     </p:spTree>
     <p:extLst>
       <p:ext uri="{BB962C8B-B14F-4D97-AF65-F5344CB8AC3E}">
-        <p14:creationId xmlns:p14="http://schemas.microsoft.com/office/powerpoint/2010/main" val="2944765398"/>
+        <p14:creationId xmlns:p14="http://schemas.microsoft.com/office/powerpoint/2010/main" val="3385485801"/>
       </p:ext>
     </p:extLst>
   </p:cSld>
@@ -9718,13 +10176,13 @@
         </p:nvSpPr>
         <p:spPr>
           <a:xfrm>
-            <a:off x="5673035" y="1760530"/>
+            <a:off x="5673035" y="2024690"/>
             <a:ext cx="6299200" cy="3731529"/>
           </a:xfrm>
         </p:spPr>
         <p:txBody>
           <a:bodyPr>
-            <a:normAutofit fontScale="90000"/>
+            <a:normAutofit/>
           </a:bodyPr>
           <a:lstStyle/>
           <a:p>
@@ -9734,15 +10192,15 @@
                   <a:schemeClr val="bg1"/>
                 </a:solidFill>
               </a:rPr>
-              <a:t>FUNCTION CHAINING </a:t>
+              <a:t>BUILDING </a:t>
             </a:r>
             <a:br>
               <a:rPr lang="en-US" dirty="0"/>
             </a:br>
-            <a:br>
+            <a:r>
               <a:rPr lang="en-US" dirty="0"/>
-            </a:br>
-            <a:endParaRPr lang="en-US" dirty="0"/>
+              <a:t>YOUR FIRST ORCHESTRATION</a:t>
+            </a:r>
           </a:p>
         </p:txBody>
       </p:sp>
@@ -9810,40 +10268,10 @@
         </p:blipFill>
         <p:spPr/>
       </p:pic>
-      <p:pic>
-        <p:nvPicPr>
-          <p:cNvPr id="12" name="Picture 11">
-            <a:extLst>
-              <a:ext uri="{FF2B5EF4-FFF2-40B4-BE49-F238E27FC236}">
-                <a16:creationId xmlns:a16="http://schemas.microsoft.com/office/drawing/2014/main" id="{3D72E2DF-24F3-01A9-93B1-DB16589BB5A6}"/>
-              </a:ext>
-            </a:extLst>
-          </p:cNvPr>
-          <p:cNvPicPr>
-            <a:picLocks noChangeAspect="1"/>
-          </p:cNvPicPr>
-          <p:nvPr/>
-        </p:nvPicPr>
-        <p:blipFill>
-          <a:blip r:embed="rId5"/>
-          <a:stretch>
-            <a:fillRect/>
-          </a:stretch>
-        </p:blipFill>
-        <p:spPr>
-          <a:xfrm>
-            <a:off x="4942840" y="4602349"/>
-            <a:ext cx="6924040" cy="1219910"/>
-          </a:xfrm>
-          <a:prstGeom prst="rect">
-            <a:avLst/>
-          </a:prstGeom>
-        </p:spPr>
-      </p:pic>
     </p:spTree>
     <p:extLst>
       <p:ext uri="{BB962C8B-B14F-4D97-AF65-F5344CB8AC3E}">
-        <p14:creationId xmlns:p14="http://schemas.microsoft.com/office/powerpoint/2010/main" val="1219442933"/>
+        <p14:creationId xmlns:p14="http://schemas.microsoft.com/office/powerpoint/2010/main" val="2944765398"/>
       </p:ext>
     </p:extLst>
   </p:cSld>
@@ -9941,7 +10369,7 @@
         </p:spPr>
         <p:txBody>
           <a:bodyPr>
-            <a:normAutofit/>
+            <a:normAutofit fontScale="90000"/>
           </a:bodyPr>
           <a:lstStyle/>
           <a:p>
@@ -9951,7 +10379,7 @@
                   <a:schemeClr val="bg1"/>
                 </a:solidFill>
               </a:rPr>
-              <a:t>FAN OUT/FAN IN</a:t>
+              <a:t>FUNCTION CHAINING </a:t>
             </a:r>
             <a:br>
               <a:rPr lang="en-US" dirty="0"/>
@@ -10029,55 +10457,38 @@
       </p:pic>
       <p:pic>
         <p:nvPicPr>
-          <p:cNvPr id="8194" name="Picture 2" descr="A diagram of the fan out/fan pattern">
-            <a:extLst>
-              <a:ext uri="{FF2B5EF4-FFF2-40B4-BE49-F238E27FC236}">
-                <a16:creationId xmlns:a16="http://schemas.microsoft.com/office/drawing/2014/main" id="{918FF539-AA14-884E-44ED-48ED3C352A43}"/>
+          <p:cNvPr id="12" name="Picture 11">
+            <a:extLst>
+              <a:ext uri="{FF2B5EF4-FFF2-40B4-BE49-F238E27FC236}">
+                <a16:creationId xmlns:a16="http://schemas.microsoft.com/office/drawing/2014/main" id="{3D72E2DF-24F3-01A9-93B1-DB16589BB5A6}"/>
               </a:ext>
             </a:extLst>
           </p:cNvPr>
           <p:cNvPicPr>
-            <a:picLocks noChangeAspect="1" noChangeArrowheads="1"/>
+            <a:picLocks noChangeAspect="1"/>
           </p:cNvPicPr>
           <p:nvPr/>
         </p:nvPicPr>
         <p:blipFill>
-          <a:blip r:embed="rId5">
-            <a:extLst>
-              <a:ext uri="{28A0092B-C50C-407E-A947-70E740481C1C}">
-                <a14:useLocalDpi xmlns:a14="http://schemas.microsoft.com/office/drawing/2010/main" val="0"/>
-              </a:ext>
-            </a:extLst>
-          </a:blip>
-          <a:srcRect/>
+          <a:blip r:embed="rId5"/>
           <a:stretch>
             <a:fillRect/>
           </a:stretch>
         </p:blipFill>
-        <p:spPr bwMode="auto">
-          <a:xfrm>
-            <a:off x="5466398" y="4017113"/>
-            <a:ext cx="5495925" cy="2724150"/>
+        <p:spPr>
+          <a:xfrm>
+            <a:off x="4942840" y="4602349"/>
+            <a:ext cx="6924040" cy="1219910"/>
           </a:xfrm>
           <a:prstGeom prst="rect">
             <a:avLst/>
           </a:prstGeom>
-          <a:noFill/>
-          <a:extLst>
-            <a:ext uri="{909E8E84-426E-40DD-AFC4-6F175D3DCCD1}">
-              <a14:hiddenFill xmlns:a14="http://schemas.microsoft.com/office/drawing/2010/main">
-                <a:solidFill>
-                  <a:srgbClr val="FFFFFF"/>
-                </a:solidFill>
-              </a14:hiddenFill>
-            </a:ext>
-          </a:extLst>
         </p:spPr>
       </p:pic>
     </p:spTree>
     <p:extLst>
       <p:ext uri="{BB962C8B-B14F-4D97-AF65-F5344CB8AC3E}">
-        <p14:creationId xmlns:p14="http://schemas.microsoft.com/office/powerpoint/2010/main" val="1987547302"/>
+        <p14:creationId xmlns:p14="http://schemas.microsoft.com/office/powerpoint/2010/main" val="1219442933"/>
       </p:ext>
     </p:extLst>
   </p:cSld>
@@ -10973,6 +11384,15 @@
 </file>
 
 <file path=customXml/item1.xml><?xml version="1.0" encoding="utf-8"?>
+<?mso-contentType ?>
+<FormTemplates xmlns="http://schemas.microsoft.com/sharepoint/v3/contenttype/forms">
+  <Display>DocumentLibraryForm</Display>
+  <Edit>DocumentLibraryForm</Edit>
+  <New>DocumentLibraryForm</New>
+</FormTemplates>
+</file>
+
+<file path=customXml/item2.xml><?xml version="1.0" encoding="utf-8"?>
 <p:properties xmlns:p="http://schemas.microsoft.com/office/2006/metadata/properties" xmlns:xsi="http://www.w3.org/2001/XMLSchema-instance" xmlns:pc="http://schemas.microsoft.com/office/infopath/2007/PartnerControls">
   <documentManagement>
     <Status xmlns="71af3243-3dd4-4a8d-8c0d-dd76da1f02a5">Not started</Status>
@@ -10990,15 +11410,6 @@
     <TaxCatchAll xmlns="230e9df3-be65-4c73-a93b-d1236ebd677e" xsi:nil="true"/>
   </documentManagement>
 </p:properties>
-</file>
-
-<file path=customXml/item2.xml><?xml version="1.0" encoding="utf-8"?>
-<?mso-contentType ?>
-<FormTemplates xmlns="http://schemas.microsoft.com/sharepoint/v3/contenttype/forms">
-  <Display>DocumentLibraryForm</Display>
-  <Edit>DocumentLibraryForm</Edit>
-  <New>DocumentLibraryForm</New>
-</FormTemplates>
 </file>
 
 <file path=customXml/item3.xml><?xml version="1.0" encoding="utf-8"?>
@@ -11314,6 +11725,14 @@
 </file>
 
 <file path=customXml/itemProps1.xml><?xml version="1.0" encoding="utf-8"?>
+<ds:datastoreItem xmlns:ds="http://schemas.openxmlformats.org/officeDocument/2006/customXml" ds:itemID="{99E4EAC9-33DC-4CF0-BA31-C98F61CE4785}">
+  <ds:schemaRefs>
+    <ds:schemaRef ds:uri="http://schemas.microsoft.com/sharepoint/v3/contenttype/forms"/>
+  </ds:schemaRefs>
+</ds:datastoreItem>
+</file>
+
+<file path=customXml/itemProps2.xml><?xml version="1.0" encoding="utf-8"?>
 <ds:datastoreItem xmlns:ds="http://schemas.openxmlformats.org/officeDocument/2006/customXml" ds:itemID="{8002A8ED-1331-4C1D-8649-743D7BE164DD}">
   <ds:schemaRefs>
     <ds:schemaRef ds:uri="http://schemas.microsoft.com/office/2006/metadata/properties"/>
@@ -11321,14 +11740,6 @@
     <ds:schemaRef ds:uri="71af3243-3dd4-4a8d-8c0d-dd76da1f02a5"/>
     <ds:schemaRef ds:uri="http://schemas.microsoft.com/sharepoint/v3"/>
     <ds:schemaRef ds:uri="230e9df3-be65-4c73-a93b-d1236ebd677e"/>
-  </ds:schemaRefs>
-</ds:datastoreItem>
-</file>
-
-<file path=customXml/itemProps2.xml><?xml version="1.0" encoding="utf-8"?>
-<ds:datastoreItem xmlns:ds="http://schemas.openxmlformats.org/officeDocument/2006/customXml" ds:itemID="{99E4EAC9-33DC-4CF0-BA31-C98F61CE4785}">
-  <ds:schemaRefs>
-    <ds:schemaRef ds:uri="http://schemas.microsoft.com/sharepoint/v3/contenttype/forms"/>
   </ds:schemaRefs>
 </ds:datastoreItem>
 </file>

</xml_diff>

<commit_message>
add glossary term and diagram (#112)
</commit_message>
<xml_diff>
--- a/2024-01-11-Intro-to-Durable-Functions/Introduction-to-durable-functions.pptx
+++ b/2024-01-11-Intro-to-Durable-Functions/Introduction-to-durable-functions.pptx
@@ -5,10 +5,10 @@
     <p:sldMasterId id="2147483648" r:id="rId4"/>
   </p:sldMasterIdLst>
   <p:notesMasterIdLst>
-    <p:notesMasterId r:id="rId17"/>
+    <p:notesMasterId r:id="rId18"/>
   </p:notesMasterIdLst>
   <p:handoutMasterIdLst>
-    <p:handoutMasterId r:id="rId18"/>
+    <p:handoutMasterId r:id="rId19"/>
   </p:handoutMasterIdLst>
   <p:sldIdLst>
     <p:sldId id="2448" r:id="rId5"/>
@@ -16,13 +16,14 @@
     <p:sldId id="259" r:id="rId7"/>
     <p:sldId id="2468" r:id="rId8"/>
     <p:sldId id="2463" r:id="rId9"/>
-    <p:sldId id="2464" r:id="rId10"/>
-    <p:sldId id="2451" r:id="rId11"/>
-    <p:sldId id="2465" r:id="rId12"/>
-    <p:sldId id="2466" r:id="rId13"/>
-    <p:sldId id="2467" r:id="rId14"/>
-    <p:sldId id="2456" r:id="rId15"/>
-    <p:sldId id="2436" r:id="rId16"/>
+    <p:sldId id="2469" r:id="rId10"/>
+    <p:sldId id="2464" r:id="rId11"/>
+    <p:sldId id="2451" r:id="rId12"/>
+    <p:sldId id="2465" r:id="rId13"/>
+    <p:sldId id="2466" r:id="rId14"/>
+    <p:sldId id="2467" r:id="rId15"/>
+    <p:sldId id="2456" r:id="rId16"/>
+    <p:sldId id="2436" r:id="rId17"/>
   </p:sldIdLst>
   <p:sldSz cx="12192000" cy="6858000"/>
   <p:notesSz cx="6858000" cy="9144000"/>
@@ -242,7 +243,7 @@
           <a:p>
             <a:fld id="{966D5B4E-BF3E-3B45-A4BA-D6C3B92870D7}" type="datetimeFigureOut">
               <a:rPr lang="en-US" smtClean="0"/>
-              <a:t>1/8/2024</a:t>
+              <a:t>1/11/2024</a:t>
             </a:fld>
             <a:endParaRPr lang="en-US" dirty="0"/>
           </a:p>
@@ -419,7 +420,7 @@
           <a:p>
             <a:fld id="{F5A8621B-8C8E-49BA-8772-41D0FE75A082}" type="datetimeFigureOut">
               <a:rPr lang="en-US" smtClean="0"/>
-              <a:t>1/8/2024</a:t>
+              <a:t>1/11/2024</a:t>
             </a:fld>
             <a:endParaRPr lang="en-US" dirty="0"/>
           </a:p>
@@ -1012,7 +1013,7 @@
     </p:spTree>
     <p:extLst>
       <p:ext uri="{BB962C8B-B14F-4D97-AF65-F5344CB8AC3E}">
-        <p14:creationId xmlns:p14="http://schemas.microsoft.com/office/powerpoint/2010/main" val="1042599596"/>
+        <p14:creationId xmlns:p14="http://schemas.microsoft.com/office/powerpoint/2010/main" val="3348868023"/>
       </p:ext>
     </p:extLst>
   </p:cSld>
@@ -1087,7 +1088,7 @@
           <a:p>
             <a:fld id="{228B34ED-4CDD-41C9-90F7-D768D5559A6F}" type="slidenum">
               <a:rPr lang="en-US" smtClean="0"/>
-              <a:t>10</a:t>
+              <a:t>7</a:t>
             </a:fld>
             <a:endParaRPr lang="en-US" dirty="0"/>
           </a:p>
@@ -1096,7 +1097,7 @@
     </p:spTree>
     <p:extLst>
       <p:ext uri="{BB962C8B-B14F-4D97-AF65-F5344CB8AC3E}">
-        <p14:creationId xmlns:p14="http://schemas.microsoft.com/office/powerpoint/2010/main" val="3588235598"/>
+        <p14:creationId xmlns:p14="http://schemas.microsoft.com/office/powerpoint/2010/main" val="1042599596"/>
       </p:ext>
     </p:extLst>
   </p:cSld>
@@ -1172,6 +1173,90 @@
             <a:fld id="{228B34ED-4CDD-41C9-90F7-D768D5559A6F}" type="slidenum">
               <a:rPr lang="en-US" smtClean="0"/>
               <a:t>11</a:t>
+            </a:fld>
+            <a:endParaRPr lang="en-US" dirty="0"/>
+          </a:p>
+        </p:txBody>
+      </p:sp>
+    </p:spTree>
+    <p:extLst>
+      <p:ext uri="{BB962C8B-B14F-4D97-AF65-F5344CB8AC3E}">
+        <p14:creationId xmlns:p14="http://schemas.microsoft.com/office/powerpoint/2010/main" val="3588235598"/>
+      </p:ext>
+    </p:extLst>
+  </p:cSld>
+  <p:clrMapOvr>
+    <a:masterClrMapping/>
+  </p:clrMapOvr>
+</p:notes>
+</file>
+
+<file path=ppt/notesSlides/notesSlide7.xml><?xml version="1.0" encoding="utf-8"?>
+<p:notes xmlns:a="http://schemas.openxmlformats.org/drawingml/2006/main" xmlns:r="http://schemas.openxmlformats.org/officeDocument/2006/relationships" xmlns:p="http://schemas.openxmlformats.org/presentationml/2006/main">
+  <p:cSld>
+    <p:spTree>
+      <p:nvGrpSpPr>
+        <p:cNvPr id="1" name=""/>
+        <p:cNvGrpSpPr/>
+        <p:nvPr/>
+      </p:nvGrpSpPr>
+      <p:grpSpPr>
+        <a:xfrm>
+          <a:off x="0" y="0"/>
+          <a:ext cx="0" cy="0"/>
+          <a:chOff x="0" y="0"/>
+          <a:chExt cx="0" cy="0"/>
+        </a:xfrm>
+      </p:grpSpPr>
+      <p:sp>
+        <p:nvSpPr>
+          <p:cNvPr id="2" name="Slide Image Placeholder 1"/>
+          <p:cNvSpPr>
+            <a:spLocks noGrp="1" noRot="1" noChangeAspect="1"/>
+          </p:cNvSpPr>
+          <p:nvPr>
+            <p:ph type="sldImg"/>
+          </p:nvPr>
+        </p:nvSpPr>
+        <p:spPr/>
+      </p:sp>
+      <p:sp>
+        <p:nvSpPr>
+          <p:cNvPr id="3" name="Notes Placeholder 2"/>
+          <p:cNvSpPr>
+            <a:spLocks noGrp="1"/>
+          </p:cNvSpPr>
+          <p:nvPr>
+            <p:ph type="body" idx="1"/>
+          </p:nvPr>
+        </p:nvSpPr>
+        <p:spPr/>
+        <p:txBody>
+          <a:bodyPr/>
+          <a:lstStyle/>
+          <a:p>
+            <a:endParaRPr lang="en-US" dirty="0"/>
+          </a:p>
+        </p:txBody>
+      </p:sp>
+      <p:sp>
+        <p:nvSpPr>
+          <p:cNvPr id="4" name="Slide Number Placeholder 3"/>
+          <p:cNvSpPr>
+            <a:spLocks noGrp="1"/>
+          </p:cNvSpPr>
+          <p:nvPr>
+            <p:ph type="sldNum" sz="quarter" idx="5"/>
+          </p:nvPr>
+        </p:nvSpPr>
+        <p:spPr/>
+        <p:txBody>
+          <a:bodyPr/>
+          <a:lstStyle/>
+          <a:p>
+            <a:fld id="{228B34ED-4CDD-41C9-90F7-D768D5559A6F}" type="slidenum">
+              <a:rPr lang="en-US" smtClean="0"/>
+              <a:t>12</a:t>
             </a:fld>
             <a:endParaRPr lang="en-US" dirty="0"/>
           </a:p>
@@ -5833,10 +5918,10 @@
       </p:grpSpPr>
       <p:pic>
         <p:nvPicPr>
-          <p:cNvPr id="12" name="Picture 4">
-            <a:extLst>
-              <a:ext uri="{FF2B5EF4-FFF2-40B4-BE49-F238E27FC236}">
-                <a16:creationId xmlns:a16="http://schemas.microsoft.com/office/drawing/2014/main" id="{D51FC426-3431-2E5B-DA9B-8B7F83F88E4E}"/>
+          <p:cNvPr id="9" name="Picture 4">
+            <a:extLst>
+              <a:ext uri="{FF2B5EF4-FFF2-40B4-BE49-F238E27FC236}">
+                <a16:creationId xmlns:a16="http://schemas.microsoft.com/office/drawing/2014/main" id="{4188B036-918C-171B-7998-5C2188B0B47E}"/>
               </a:ext>
             </a:extLst>
           </p:cNvPr>
@@ -5846,7 +5931,7 @@
           <p:nvPr/>
         </p:nvPicPr>
         <p:blipFill>
-          <a:blip r:embed="rId3">
+          <a:blip r:embed="rId2">
             <a:extLst>
               <a:ext uri="{28A0092B-C50C-407E-A947-70E740481C1C}">
                 <a14:useLocalDpi xmlns:a14="http://schemas.microsoft.com/office/drawing/2010/main" val="0"/>
@@ -5880,6 +5965,240 @@
       </p:pic>
       <p:sp>
         <p:nvSpPr>
+          <p:cNvPr id="3" name="Title 2">
+            <a:extLst>
+              <a:ext uri="{FF2B5EF4-FFF2-40B4-BE49-F238E27FC236}">
+                <a16:creationId xmlns:a16="http://schemas.microsoft.com/office/drawing/2014/main" id="{1D24B42B-925B-494C-A986-BD85E8117E1E}"/>
+              </a:ext>
+            </a:extLst>
+          </p:cNvPr>
+          <p:cNvSpPr>
+            <a:spLocks noGrp="1"/>
+          </p:cNvSpPr>
+          <p:nvPr>
+            <p:ph type="title"/>
+          </p:nvPr>
+        </p:nvSpPr>
+        <p:spPr>
+          <a:xfrm>
+            <a:off x="5673035" y="1760530"/>
+            <a:ext cx="6299200" cy="3731529"/>
+          </a:xfrm>
+        </p:spPr>
+        <p:txBody>
+          <a:bodyPr>
+            <a:normAutofit/>
+          </a:bodyPr>
+          <a:lstStyle/>
+          <a:p>
+            <a:r>
+              <a:rPr lang="en-US" dirty="0">
+                <a:solidFill>
+                  <a:schemeClr val="bg1"/>
+                </a:solidFill>
+              </a:rPr>
+              <a:t>FAN OUT/FAN IN</a:t>
+            </a:r>
+            <a:br>
+              <a:rPr lang="en-US" dirty="0"/>
+            </a:br>
+            <a:br>
+              <a:rPr lang="en-US" dirty="0"/>
+            </a:br>
+            <a:endParaRPr lang="en-US" dirty="0"/>
+          </a:p>
+        </p:txBody>
+      </p:sp>
+      <p:sp>
+        <p:nvSpPr>
+          <p:cNvPr id="6" name="Slide Number Placeholder 5">
+            <a:extLst>
+              <a:ext uri="{FF2B5EF4-FFF2-40B4-BE49-F238E27FC236}">
+                <a16:creationId xmlns:a16="http://schemas.microsoft.com/office/drawing/2014/main" id="{FC6A5C12-E784-444E-B868-DE2AE85742BB}"/>
+              </a:ext>
+            </a:extLst>
+          </p:cNvPr>
+          <p:cNvSpPr>
+            <a:spLocks noGrp="1"/>
+          </p:cNvSpPr>
+          <p:nvPr>
+            <p:ph type="sldNum" sz="quarter" idx="12"/>
+          </p:nvPr>
+        </p:nvSpPr>
+        <p:spPr/>
+        <p:txBody>
+          <a:bodyPr/>
+          <a:lstStyle/>
+          <a:p>
+            <a:fld id="{8C2E478F-E849-4A8C-AF1F-CBCC78A7CBFA}" type="slidenum">
+              <a:rPr lang="en-US" smtClean="0"/>
+              <a:t>10</a:t>
+            </a:fld>
+            <a:endParaRPr lang="en-US" dirty="0"/>
+          </a:p>
+        </p:txBody>
+      </p:sp>
+      <p:pic>
+        <p:nvPicPr>
+          <p:cNvPr id="8" name="Picture Placeholder 7" descr="close up of computer code">
+            <a:extLst>
+              <a:ext uri="{FF2B5EF4-FFF2-40B4-BE49-F238E27FC236}">
+                <a16:creationId xmlns:a16="http://schemas.microsoft.com/office/drawing/2014/main" id="{A596BF19-CC58-4709-B5D6-3FC378FDC7BA}"/>
+              </a:ext>
+            </a:extLst>
+          </p:cNvPr>
+          <p:cNvPicPr>
+            <a:picLocks noGrp="1" noChangeAspect="1"/>
+          </p:cNvPicPr>
+          <p:nvPr>
+            <p:ph type="pic" sz="quarter" idx="13"/>
+          </p:nvPr>
+        </p:nvPicPr>
+        <p:blipFill rotWithShape="1">
+          <a:blip r:embed="rId3">
+            <a:extLst>
+              <a:ext uri="{BEBA8EAE-BF5A-486C-A8C5-ECC9F3942E4B}">
+                <a14:imgProps xmlns:a14="http://schemas.microsoft.com/office/drawing/2010/main">
+                  <a14:imgLayer r:embed="rId4">
+                    <a14:imgEffect>
+                      <a14:saturation sat="0"/>
+                    </a14:imgEffect>
+                  </a14:imgLayer>
+                </a14:imgProps>
+              </a:ext>
+            </a:extLst>
+          </a:blip>
+          <a:srcRect l="20370" r="20370"/>
+          <a:stretch/>
+        </p:blipFill>
+        <p:spPr/>
+      </p:pic>
+      <p:pic>
+        <p:nvPicPr>
+          <p:cNvPr id="8194" name="Picture 2" descr="A diagram of the fan out/fan pattern">
+            <a:extLst>
+              <a:ext uri="{FF2B5EF4-FFF2-40B4-BE49-F238E27FC236}">
+                <a16:creationId xmlns:a16="http://schemas.microsoft.com/office/drawing/2014/main" id="{918FF539-AA14-884E-44ED-48ED3C352A43}"/>
+              </a:ext>
+            </a:extLst>
+          </p:cNvPr>
+          <p:cNvPicPr>
+            <a:picLocks noChangeAspect="1" noChangeArrowheads="1"/>
+          </p:cNvPicPr>
+          <p:nvPr/>
+        </p:nvPicPr>
+        <p:blipFill>
+          <a:blip r:embed="rId5">
+            <a:extLst>
+              <a:ext uri="{28A0092B-C50C-407E-A947-70E740481C1C}">
+                <a14:useLocalDpi xmlns:a14="http://schemas.microsoft.com/office/drawing/2010/main" val="0"/>
+              </a:ext>
+            </a:extLst>
+          </a:blip>
+          <a:srcRect/>
+          <a:stretch>
+            <a:fillRect/>
+          </a:stretch>
+        </p:blipFill>
+        <p:spPr bwMode="auto">
+          <a:xfrm>
+            <a:off x="5466398" y="4017113"/>
+            <a:ext cx="5495925" cy="2724150"/>
+          </a:xfrm>
+          <a:prstGeom prst="rect">
+            <a:avLst/>
+          </a:prstGeom>
+          <a:noFill/>
+          <a:extLst>
+            <a:ext uri="{909E8E84-426E-40DD-AFC4-6F175D3DCCD1}">
+              <a14:hiddenFill xmlns:a14="http://schemas.microsoft.com/office/drawing/2010/main">
+                <a:solidFill>
+                  <a:srgbClr val="FFFFFF"/>
+                </a:solidFill>
+              </a14:hiddenFill>
+            </a:ext>
+          </a:extLst>
+        </p:spPr>
+      </p:pic>
+    </p:spTree>
+    <p:extLst>
+      <p:ext uri="{BB962C8B-B14F-4D97-AF65-F5344CB8AC3E}">
+        <p14:creationId xmlns:p14="http://schemas.microsoft.com/office/powerpoint/2010/main" val="1987547302"/>
+      </p:ext>
+    </p:extLst>
+  </p:cSld>
+  <p:clrMapOvr>
+    <a:masterClrMapping/>
+  </p:clrMapOvr>
+</p:sld>
+</file>
+
+<file path=ppt/slides/slide11.xml><?xml version="1.0" encoding="utf-8"?>
+<p:sld xmlns:a="http://schemas.openxmlformats.org/drawingml/2006/main" xmlns:r="http://schemas.openxmlformats.org/officeDocument/2006/relationships" xmlns:p="http://schemas.openxmlformats.org/presentationml/2006/main">
+  <p:cSld>
+    <p:spTree>
+      <p:nvGrpSpPr>
+        <p:cNvPr id="1" name=""/>
+        <p:cNvGrpSpPr/>
+        <p:nvPr/>
+      </p:nvGrpSpPr>
+      <p:grpSpPr>
+        <a:xfrm>
+          <a:off x="0" y="0"/>
+          <a:ext cx="0" cy="0"/>
+          <a:chOff x="0" y="0"/>
+          <a:chExt cx="0" cy="0"/>
+        </a:xfrm>
+      </p:grpSpPr>
+      <p:pic>
+        <p:nvPicPr>
+          <p:cNvPr id="12" name="Picture 4">
+            <a:extLst>
+              <a:ext uri="{FF2B5EF4-FFF2-40B4-BE49-F238E27FC236}">
+                <a16:creationId xmlns:a16="http://schemas.microsoft.com/office/drawing/2014/main" id="{D51FC426-3431-2E5B-DA9B-8B7F83F88E4E}"/>
+              </a:ext>
+            </a:extLst>
+          </p:cNvPr>
+          <p:cNvPicPr>
+            <a:picLocks noChangeAspect="1" noChangeArrowheads="1"/>
+          </p:cNvPicPr>
+          <p:nvPr/>
+        </p:nvPicPr>
+        <p:blipFill>
+          <a:blip r:embed="rId3">
+            <a:extLst>
+              <a:ext uri="{28A0092B-C50C-407E-A947-70E740481C1C}">
+                <a14:useLocalDpi xmlns:a14="http://schemas.microsoft.com/office/drawing/2010/main" val="0"/>
+              </a:ext>
+            </a:extLst>
+          </a:blip>
+          <a:srcRect/>
+          <a:stretch>
+            <a:fillRect/>
+          </a:stretch>
+        </p:blipFill>
+        <p:spPr bwMode="auto">
+          <a:xfrm>
+            <a:off x="-1" y="-330200"/>
+            <a:ext cx="15196735" cy="4220655"/>
+          </a:xfrm>
+          <a:prstGeom prst="rect">
+            <a:avLst/>
+          </a:prstGeom>
+          <a:noFill/>
+          <a:extLst>
+            <a:ext uri="{909E8E84-426E-40DD-AFC4-6F175D3DCCD1}">
+              <a14:hiddenFill xmlns:a14="http://schemas.microsoft.com/office/drawing/2010/main">
+                <a:solidFill>
+                  <a:srgbClr val="FFFFFF"/>
+                </a:solidFill>
+              </a14:hiddenFill>
+            </a:ext>
+          </a:extLst>
+        </p:spPr>
+      </p:pic>
+      <p:sp>
+        <p:nvSpPr>
           <p:cNvPr id="8" name="Title 7">
             <a:extLst>
               <a:ext uri="{FF2B5EF4-FFF2-40B4-BE49-F238E27FC236}">
@@ -5978,7 +6297,7 @@
           <a:p>
             <a:fld id="{8C2E478F-E849-4A8C-AF1F-CBCC78A7CBFA}" type="slidenum">
               <a:rPr lang="en-US" smtClean="0"/>
-              <a:t>10</a:t>
+              <a:t>11</a:t>
             </a:fld>
             <a:endParaRPr lang="en-US" dirty="0"/>
           </a:p>
@@ -6560,7 +6879,7 @@
 </p:sld>
 </file>
 
-<file path=ppt/slides/slide11.xml><?xml version="1.0" encoding="utf-8"?>
+<file path=ppt/slides/slide12.xml><?xml version="1.0" encoding="utf-8"?>
 <p:sld xmlns:a="http://schemas.openxmlformats.org/drawingml/2006/main" xmlns:r="http://schemas.openxmlformats.org/officeDocument/2006/relationships" xmlns:p="http://schemas.openxmlformats.org/presentationml/2006/main">
   <p:cSld>
     <p:spTree>
@@ -7054,7 +7373,7 @@
           <a:p>
             <a:fld id="{8C2E478F-E849-4A8C-AF1F-CBCC78A7CBFA}" type="slidenum">
               <a:rPr lang="en-US" smtClean="0"/>
-              <a:t>11</a:t>
+              <a:t>12</a:t>
             </a:fld>
             <a:endParaRPr lang="en-US" dirty="0"/>
           </a:p>
@@ -7073,7 +7392,7 @@
 </p:sld>
 </file>
 
-<file path=ppt/slides/slide12.xml><?xml version="1.0" encoding="utf-8"?>
+<file path=ppt/slides/slide13.xml><?xml version="1.0" encoding="utf-8"?>
 <p:sld xmlns:a="http://schemas.openxmlformats.org/drawingml/2006/main" xmlns:r="http://schemas.openxmlformats.org/officeDocument/2006/relationships" xmlns:p="http://schemas.openxmlformats.org/presentationml/2006/main">
   <p:cSld>
     <p:bg>
@@ -8411,7 +8730,7 @@
         </p:blipFill>
         <p:spPr bwMode="auto">
           <a:xfrm>
-            <a:off x="-1" y="-330200"/>
+            <a:off x="0" y="-330200"/>
             <a:ext cx="15196735" cy="4220655"/>
           </a:xfrm>
           <a:prstGeom prst="rect">
@@ -8524,13 +8843,13 @@
         </p:nvSpPr>
         <p:spPr>
           <a:xfrm>
-            <a:off x="5842000" y="2840257"/>
-            <a:ext cx="4646246" cy="3159223"/>
+            <a:off x="5828999" y="3048272"/>
+            <a:ext cx="4646246" cy="3473870"/>
           </a:xfrm>
         </p:spPr>
         <p:txBody>
           <a:bodyPr>
-            <a:normAutofit/>
+            <a:normAutofit fontScale="92500" lnSpcReduction="20000"/>
           </a:bodyPr>
           <a:lstStyle/>
           <a:p>
@@ -8564,6 +8883,33 @@
                 <a:cs typeface="Biome Light" panose="020B0303030204020804" pitchFamily="34" charset="0"/>
               </a:rPr>
               <a:t>Always returns the result if given the same inputs</a:t>
+            </a:r>
+          </a:p>
+          <a:p>
+            <a:pPr marL="0" indent="0">
+              <a:lnSpc>
+                <a:spcPct val="100000"/>
+              </a:lnSpc>
+              <a:buNone/>
+            </a:pPr>
+            <a:r>
+              <a:rPr lang="en-US" sz="1800" dirty="0">
+                <a:cs typeface="Biome Light" panose="020B0303030204020804" pitchFamily="34" charset="0"/>
+              </a:rPr>
+              <a:t>CLIENT</a:t>
+            </a:r>
+          </a:p>
+          <a:p>
+            <a:pPr>
+              <a:lnSpc>
+                <a:spcPct val="100000"/>
+              </a:lnSpc>
+            </a:pPr>
+            <a:r>
+              <a:rPr lang="en-US" sz="1800" dirty="0">
+                <a:cs typeface="Biome Light" panose="020B0303030204020804" pitchFamily="34" charset="0"/>
+              </a:rPr>
+              <a:t>Starts or sends commands to orchestrator - START</a:t>
             </a:r>
           </a:p>
           <a:p>
@@ -8749,7 +9095,7 @@
         </p:blipFill>
         <p:spPr bwMode="auto">
           <a:xfrm>
-            <a:off x="-1" y="-330200"/>
+            <a:off x="0" y="-330200"/>
             <a:ext cx="15196735" cy="4220655"/>
           </a:xfrm>
           <a:prstGeom prst="rect">
@@ -8902,499 +9248,52 @@
           <a:lstStyle/>
           <a:p>
             <a:r>
-              <a:rPr lang="en-US" dirty="0">
+              <a:rPr lang="en-US">
                 <a:solidFill>
                   <a:schemeClr val="bg1"/>
                 </a:solidFill>
               </a:rPr>
-              <a:t>Example Orchestration</a:t>
-            </a:r>
-          </a:p>
-        </p:txBody>
-      </p:sp>
-      <p:sp>
-        <p:nvSpPr>
-          <p:cNvPr id="7" name="Oval 6">
-            <a:extLst>
-              <a:ext uri="{FF2B5EF4-FFF2-40B4-BE49-F238E27FC236}">
-                <a16:creationId xmlns:a16="http://schemas.microsoft.com/office/drawing/2014/main" id="{281C3990-3C33-560D-2452-938D972309C9}"/>
-              </a:ext>
-            </a:extLst>
-          </p:cNvPr>
-          <p:cNvSpPr/>
-          <p:nvPr/>
-        </p:nvSpPr>
-        <p:spPr>
-          <a:xfrm>
-            <a:off x="5750560" y="2508544"/>
-            <a:ext cx="1884680" cy="1103335"/>
-          </a:xfrm>
-          <a:prstGeom prst="ellipse">
-            <a:avLst/>
-          </a:prstGeom>
-        </p:spPr>
-        <p:style>
-          <a:lnRef idx="2">
-            <a:schemeClr val="accent1">
-              <a:shade val="15000"/>
-            </a:schemeClr>
-          </a:lnRef>
-          <a:fillRef idx="1">
-            <a:schemeClr val="accent1"/>
-          </a:fillRef>
-          <a:effectRef idx="0">
-            <a:schemeClr val="accent1"/>
-          </a:effectRef>
-          <a:fontRef idx="minor">
-            <a:schemeClr val="lt1"/>
-          </a:fontRef>
-        </p:style>
-        <p:txBody>
-          <a:bodyPr rtlCol="0" anchor="ctr"/>
+              <a:t>Flow Diagram</a:t>
+            </a:r>
+            <a:endParaRPr lang="en-US" dirty="0">
+              <a:solidFill>
+                <a:schemeClr val="bg1"/>
+              </a:solidFill>
+            </a:endParaRPr>
+          </a:p>
+        </p:txBody>
+      </p:sp>
+      <p:sp>
+        <p:nvSpPr>
+          <p:cNvPr id="3" name="Content Placeholder 2">
+            <a:extLst>
+              <a:ext uri="{FF2B5EF4-FFF2-40B4-BE49-F238E27FC236}">
+                <a16:creationId xmlns:a16="http://schemas.microsoft.com/office/drawing/2014/main" id="{55BFDCFB-8DB8-64FF-EFA7-3A1D78AC60DB}"/>
+              </a:ext>
+            </a:extLst>
+          </p:cNvPr>
+          <p:cNvSpPr>
+            <a:spLocks noGrp="1"/>
+          </p:cNvSpPr>
+          <p:nvPr>
+            <p:ph idx="1"/>
+          </p:nvPr>
+        </p:nvSpPr>
+        <p:spPr/>
+        <p:txBody>
+          <a:bodyPr/>
           <a:lstStyle/>
           <a:p>
-            <a:pPr algn="ctr"/>
-            <a:r>
-              <a:rPr lang="en-US" dirty="0"/>
-              <a:t>Customer Places Pizza Order</a:t>
-            </a:r>
-          </a:p>
-        </p:txBody>
-      </p:sp>
-      <p:sp>
-        <p:nvSpPr>
-          <p:cNvPr id="10" name="Rectangle 9">
-            <a:extLst>
-              <a:ext uri="{FF2B5EF4-FFF2-40B4-BE49-F238E27FC236}">
-                <a16:creationId xmlns:a16="http://schemas.microsoft.com/office/drawing/2014/main" id="{9949F67E-4A72-5F8B-4AE8-843EB013926F}"/>
-              </a:ext>
-            </a:extLst>
-          </p:cNvPr>
-          <p:cNvSpPr/>
-          <p:nvPr/>
-        </p:nvSpPr>
-        <p:spPr>
-          <a:xfrm>
-            <a:off x="6893560" y="4112793"/>
-            <a:ext cx="1676400" cy="743687"/>
-          </a:xfrm>
-          <a:prstGeom prst="rect">
-            <a:avLst/>
-          </a:prstGeom>
-        </p:spPr>
-        <p:style>
-          <a:lnRef idx="2">
-            <a:schemeClr val="accent1">
-              <a:shade val="15000"/>
-            </a:schemeClr>
-          </a:lnRef>
-          <a:fillRef idx="1">
-            <a:schemeClr val="accent1"/>
-          </a:fillRef>
-          <a:effectRef idx="0">
-            <a:schemeClr val="accent1"/>
-          </a:effectRef>
-          <a:fontRef idx="minor">
-            <a:schemeClr val="lt1"/>
-          </a:fontRef>
-        </p:style>
-        <p:txBody>
-          <a:bodyPr rtlCol="0" anchor="ctr"/>
-          <a:lstStyle/>
-          <a:p>
-            <a:pPr algn="ctr"/>
-            <a:r>
-              <a:rPr lang="en-US" dirty="0"/>
-              <a:t>Send Order to Store</a:t>
-            </a:r>
-          </a:p>
-        </p:txBody>
-      </p:sp>
-      <p:sp>
-        <p:nvSpPr>
-          <p:cNvPr id="11" name="Rectangle 10">
-            <a:extLst>
-              <a:ext uri="{FF2B5EF4-FFF2-40B4-BE49-F238E27FC236}">
-                <a16:creationId xmlns:a16="http://schemas.microsoft.com/office/drawing/2014/main" id="{3EAF83B1-055A-0B65-042C-0331D6026500}"/>
-              </a:ext>
-            </a:extLst>
-          </p:cNvPr>
-          <p:cNvSpPr/>
-          <p:nvPr/>
-        </p:nvSpPr>
-        <p:spPr>
-          <a:xfrm>
-            <a:off x="6893560" y="5076622"/>
-            <a:ext cx="1676400" cy="743687"/>
-          </a:xfrm>
-          <a:prstGeom prst="rect">
-            <a:avLst/>
-          </a:prstGeom>
-        </p:spPr>
-        <p:style>
-          <a:lnRef idx="2">
-            <a:schemeClr val="accent1">
-              <a:shade val="15000"/>
-            </a:schemeClr>
-          </a:lnRef>
-          <a:fillRef idx="1">
-            <a:schemeClr val="accent1"/>
-          </a:fillRef>
-          <a:effectRef idx="0">
-            <a:schemeClr val="accent1"/>
-          </a:effectRef>
-          <a:fontRef idx="minor">
-            <a:schemeClr val="lt1"/>
-          </a:fontRef>
-        </p:style>
-        <p:txBody>
-          <a:bodyPr rtlCol="0" anchor="ctr"/>
-          <a:lstStyle/>
-          <a:p>
-            <a:pPr algn="ctr"/>
-            <a:r>
-              <a:rPr lang="en-US" dirty="0"/>
-              <a:t>Wait for Pizza Made</a:t>
-            </a:r>
-          </a:p>
-        </p:txBody>
-      </p:sp>
-      <p:sp>
-        <p:nvSpPr>
-          <p:cNvPr id="13" name="Rectangle 12">
-            <a:extLst>
-              <a:ext uri="{FF2B5EF4-FFF2-40B4-BE49-F238E27FC236}">
-                <a16:creationId xmlns:a16="http://schemas.microsoft.com/office/drawing/2014/main" id="{98B90BB5-B2DF-C6C4-3CFB-6E3F88ABDDC7}"/>
-              </a:ext>
-            </a:extLst>
-          </p:cNvPr>
-          <p:cNvSpPr/>
-          <p:nvPr/>
-        </p:nvSpPr>
-        <p:spPr>
-          <a:xfrm>
-            <a:off x="6893560" y="6042647"/>
-            <a:ext cx="1676400" cy="743687"/>
-          </a:xfrm>
-          <a:prstGeom prst="rect">
-            <a:avLst/>
-          </a:prstGeom>
-        </p:spPr>
-        <p:style>
-          <a:lnRef idx="2">
-            <a:schemeClr val="accent1">
-              <a:shade val="15000"/>
-            </a:schemeClr>
-          </a:lnRef>
-          <a:fillRef idx="1">
-            <a:schemeClr val="accent1"/>
-          </a:fillRef>
-          <a:effectRef idx="0">
-            <a:schemeClr val="accent1"/>
-          </a:effectRef>
-          <a:fontRef idx="minor">
-            <a:schemeClr val="lt1"/>
-          </a:fontRef>
-        </p:style>
-        <p:txBody>
-          <a:bodyPr rtlCol="0" anchor="ctr"/>
-          <a:lstStyle/>
-          <a:p>
-            <a:pPr algn="ctr"/>
-            <a:r>
-              <a:rPr lang="en-US" dirty="0"/>
-              <a:t>Send Customer Notification</a:t>
-            </a:r>
+            <a:endParaRPr lang="en-US"/>
           </a:p>
         </p:txBody>
       </p:sp>
       <p:pic>
         <p:nvPicPr>
-          <p:cNvPr id="15" name="Graphic 14" descr="Chef male with solid fill">
-            <a:extLst>
-              <a:ext uri="{FF2B5EF4-FFF2-40B4-BE49-F238E27FC236}">
-                <a16:creationId xmlns:a16="http://schemas.microsoft.com/office/drawing/2014/main" id="{0194B278-EB30-F77E-1B2A-DA636A67EFEA}"/>
-              </a:ext>
-            </a:extLst>
-          </p:cNvPr>
-          <p:cNvPicPr>
-            <a:picLocks noChangeAspect="1"/>
-          </p:cNvPicPr>
-          <p:nvPr/>
-        </p:nvPicPr>
-        <p:blipFill>
-          <a:blip r:embed="rId6">
-            <a:extLst>
-              <a:ext uri="{96DAC541-7B7A-43D3-8B79-37D633B846F1}">
-                <asvg:svgBlip xmlns:asvg="http://schemas.microsoft.com/office/drawing/2016/SVG/main" r:embed="rId7"/>
-              </a:ext>
-            </a:extLst>
-          </a:blip>
-          <a:stretch>
-            <a:fillRect/>
-          </a:stretch>
-        </p:blipFill>
-        <p:spPr>
-          <a:xfrm>
-            <a:off x="10380869" y="4025825"/>
-            <a:ext cx="914400" cy="914400"/>
-          </a:xfrm>
-          <a:prstGeom prst="rect">
-            <a:avLst/>
-          </a:prstGeom>
-        </p:spPr>
-      </p:pic>
-      <p:sp>
-        <p:nvSpPr>
-          <p:cNvPr id="22" name="TextBox 21">
-            <a:extLst>
-              <a:ext uri="{FF2B5EF4-FFF2-40B4-BE49-F238E27FC236}">
-                <a16:creationId xmlns:a16="http://schemas.microsoft.com/office/drawing/2014/main" id="{71E33CF6-ABA1-8FC9-EE11-5638374C57BA}"/>
-              </a:ext>
-            </a:extLst>
-          </p:cNvPr>
-          <p:cNvSpPr txBox="1"/>
-          <p:nvPr/>
-        </p:nvSpPr>
-        <p:spPr>
-          <a:xfrm>
-            <a:off x="9098280" y="5395813"/>
-            <a:ext cx="1815369" cy="369332"/>
-          </a:xfrm>
-          <a:prstGeom prst="rect">
-            <a:avLst/>
-          </a:prstGeom>
-          <a:noFill/>
-        </p:spPr>
-        <p:txBody>
-          <a:bodyPr wrap="none" rtlCol="0">
-            <a:spAutoFit/>
-          </a:bodyPr>
-          <a:lstStyle/>
-          <a:p>
-            <a:r>
-              <a:rPr lang="en-US" dirty="0"/>
-              <a:t>Clicks Pizza Made</a:t>
-            </a:r>
-          </a:p>
-        </p:txBody>
-      </p:sp>
-      <p:cxnSp>
-        <p:nvCxnSpPr>
-          <p:cNvPr id="26" name="Connector: Elbow 25">
-            <a:extLst>
-              <a:ext uri="{FF2B5EF4-FFF2-40B4-BE49-F238E27FC236}">
-                <a16:creationId xmlns:a16="http://schemas.microsoft.com/office/drawing/2014/main" id="{8829843A-C1B0-C94B-2B10-66771B0E3BF7}"/>
-              </a:ext>
-            </a:extLst>
-          </p:cNvPr>
-          <p:cNvCxnSpPr>
-            <a:cxnSpLocks/>
-            <a:stCxn id="7" idx="4"/>
-            <a:endCxn id="10" idx="1"/>
-          </p:cNvCxnSpPr>
-          <p:nvPr/>
-        </p:nvCxnSpPr>
-        <p:spPr>
-          <a:xfrm rot="16200000" flipH="1">
-            <a:off x="6356851" y="3947928"/>
-            <a:ext cx="872758" cy="200660"/>
-          </a:xfrm>
-          <a:prstGeom prst="bentConnector2">
-            <a:avLst/>
-          </a:prstGeom>
-          <a:ln w="28575">
-            <a:tailEnd type="triangle"/>
-          </a:ln>
-        </p:spPr>
-        <p:style>
-          <a:lnRef idx="1">
-            <a:schemeClr val="accent1"/>
-          </a:lnRef>
-          <a:fillRef idx="0">
-            <a:schemeClr val="accent1"/>
-          </a:fillRef>
-          <a:effectRef idx="0">
-            <a:schemeClr val="accent1"/>
-          </a:effectRef>
-          <a:fontRef idx="minor">
-            <a:schemeClr val="tx1"/>
-          </a:fontRef>
-        </p:style>
-      </p:cxnSp>
-      <p:cxnSp>
-        <p:nvCxnSpPr>
-          <p:cNvPr id="33" name="Connector: Elbow 32">
-            <a:extLst>
-              <a:ext uri="{FF2B5EF4-FFF2-40B4-BE49-F238E27FC236}">
-                <a16:creationId xmlns:a16="http://schemas.microsoft.com/office/drawing/2014/main" id="{CF83FE70-17C6-1923-337B-2B974BCEE92E}"/>
-              </a:ext>
-            </a:extLst>
-          </p:cNvPr>
-          <p:cNvCxnSpPr>
-            <a:cxnSpLocks/>
-            <a:stCxn id="10" idx="3"/>
-          </p:cNvCxnSpPr>
-          <p:nvPr/>
-        </p:nvCxnSpPr>
-        <p:spPr>
-          <a:xfrm flipV="1">
-            <a:off x="8569960" y="4017333"/>
-            <a:ext cx="2268109" cy="467304"/>
-          </a:xfrm>
-          <a:prstGeom prst="bentConnector3">
-            <a:avLst>
-              <a:gd name="adj1" fmla="val 50000"/>
-            </a:avLst>
-          </a:prstGeom>
-          <a:ln w="28575">
-            <a:tailEnd type="triangle"/>
-          </a:ln>
-        </p:spPr>
-        <p:style>
-          <a:lnRef idx="1">
-            <a:schemeClr val="accent1"/>
-          </a:lnRef>
-          <a:fillRef idx="0">
-            <a:schemeClr val="accent1"/>
-          </a:fillRef>
-          <a:effectRef idx="0">
-            <a:schemeClr val="accent1"/>
-          </a:effectRef>
-          <a:fontRef idx="minor">
-            <a:schemeClr val="tx1"/>
-          </a:fontRef>
-        </p:style>
-      </p:cxnSp>
-      <p:cxnSp>
-        <p:nvCxnSpPr>
-          <p:cNvPr id="36" name="Connector: Elbow 35">
-            <a:extLst>
-              <a:ext uri="{FF2B5EF4-FFF2-40B4-BE49-F238E27FC236}">
-                <a16:creationId xmlns:a16="http://schemas.microsoft.com/office/drawing/2014/main" id="{7F64836B-EE0F-1D61-50B6-FC8F737566CD}"/>
-              </a:ext>
-            </a:extLst>
-          </p:cNvPr>
-          <p:cNvCxnSpPr>
-            <a:cxnSpLocks/>
-            <a:stCxn id="15" idx="2"/>
-            <a:endCxn id="11" idx="3"/>
-          </p:cNvCxnSpPr>
-          <p:nvPr/>
-        </p:nvCxnSpPr>
-        <p:spPr>
-          <a:xfrm rot="5400000">
-            <a:off x="9449895" y="4060291"/>
-            <a:ext cx="508241" cy="2268109"/>
-          </a:xfrm>
-          <a:prstGeom prst="bentConnector2">
-            <a:avLst/>
-          </a:prstGeom>
-          <a:ln w="28575">
-            <a:tailEnd type="triangle"/>
-          </a:ln>
-        </p:spPr>
-        <p:style>
-          <a:lnRef idx="1">
-            <a:schemeClr val="accent1"/>
-          </a:lnRef>
-          <a:fillRef idx="0">
-            <a:schemeClr val="accent1"/>
-          </a:fillRef>
-          <a:effectRef idx="0">
-            <a:schemeClr val="accent1"/>
-          </a:effectRef>
-          <a:fontRef idx="minor">
-            <a:schemeClr val="tx1"/>
-          </a:fontRef>
-        </p:style>
-      </p:cxnSp>
-      <p:cxnSp>
-        <p:nvCxnSpPr>
-          <p:cNvPr id="41" name="Connector: Elbow 40">
-            <a:extLst>
-              <a:ext uri="{FF2B5EF4-FFF2-40B4-BE49-F238E27FC236}">
-                <a16:creationId xmlns:a16="http://schemas.microsoft.com/office/drawing/2014/main" id="{B4FF0B41-E6A1-60C4-1142-FCD0F3D00159}"/>
-              </a:ext>
-            </a:extLst>
-          </p:cNvPr>
-          <p:cNvCxnSpPr>
-            <a:cxnSpLocks/>
-            <a:stCxn id="11" idx="2"/>
-            <a:endCxn id="13" idx="0"/>
-          </p:cNvCxnSpPr>
-          <p:nvPr/>
-        </p:nvCxnSpPr>
-        <p:spPr>
-          <a:xfrm rot="5400000">
-            <a:off x="7620591" y="5931478"/>
-            <a:ext cx="222338" cy="12700"/>
-          </a:xfrm>
-          <a:prstGeom prst="bentConnector3">
-            <a:avLst>
-              <a:gd name="adj1" fmla="val 50000"/>
-            </a:avLst>
-          </a:prstGeom>
-          <a:ln w="28575">
-            <a:tailEnd type="triangle"/>
-          </a:ln>
-        </p:spPr>
-        <p:style>
-          <a:lnRef idx="1">
-            <a:schemeClr val="accent1"/>
-          </a:lnRef>
-          <a:fillRef idx="0">
-            <a:schemeClr val="accent1"/>
-          </a:fillRef>
-          <a:effectRef idx="0">
-            <a:schemeClr val="accent1"/>
-          </a:effectRef>
-          <a:fontRef idx="minor">
-            <a:schemeClr val="tx1"/>
-          </a:fontRef>
-        </p:style>
-      </p:cxnSp>
-      <p:sp>
-        <p:nvSpPr>
-          <p:cNvPr id="44" name="TextBox 43">
-            <a:extLst>
-              <a:ext uri="{FF2B5EF4-FFF2-40B4-BE49-F238E27FC236}">
-                <a16:creationId xmlns:a16="http://schemas.microsoft.com/office/drawing/2014/main" id="{6AC151CC-5187-8977-9CB8-17EF7EE1997A}"/>
-              </a:ext>
-            </a:extLst>
-          </p:cNvPr>
-          <p:cNvSpPr txBox="1"/>
-          <p:nvPr/>
-        </p:nvSpPr>
-        <p:spPr>
-          <a:xfrm>
-            <a:off x="8620760" y="4517696"/>
-            <a:ext cx="1218539" cy="369332"/>
-          </a:xfrm>
-          <a:prstGeom prst="rect">
-            <a:avLst/>
-          </a:prstGeom>
-          <a:noFill/>
-        </p:spPr>
-        <p:txBody>
-          <a:bodyPr wrap="none" rtlCol="0">
-            <a:spAutoFit/>
-          </a:bodyPr>
-          <a:lstStyle/>
-          <a:p>
-            <a:r>
-              <a:rPr lang="en-US" dirty="0"/>
-              <a:t>Make Pizza</a:t>
-            </a:r>
-          </a:p>
-        </p:txBody>
-      </p:sp>
-      <p:pic>
-        <p:nvPicPr>
-          <p:cNvPr id="3074" name="Picture 2">
-            <a:extLst>
-              <a:ext uri="{FF2B5EF4-FFF2-40B4-BE49-F238E27FC236}">
-                <a16:creationId xmlns:a16="http://schemas.microsoft.com/office/drawing/2014/main" id="{CC34E186-7519-9F79-7839-F2EC906B981C}"/>
+          <p:cNvPr id="1026" name="Picture 2" descr="Durable Functions components">
+            <a:extLst>
+              <a:ext uri="{FF2B5EF4-FFF2-40B4-BE49-F238E27FC236}">
+                <a16:creationId xmlns:a16="http://schemas.microsoft.com/office/drawing/2014/main" id="{7E8893DC-EC09-1523-2C74-19B6C73306C1}"/>
               </a:ext>
             </a:extLst>
           </p:cNvPr>
@@ -9404,7 +9303,7 @@
           <p:nvPr/>
         </p:nvPicPr>
         <p:blipFill>
-          <a:blip r:embed="rId8">
+          <a:blip r:embed="rId6">
             <a:extLst>
               <a:ext uri="{28A0092B-C50C-407E-A947-70E740481C1C}">
                 <a14:useLocalDpi xmlns:a14="http://schemas.microsoft.com/office/drawing/2010/main" val="0"/>
@@ -9418,8 +9317,8 @@
         </p:blipFill>
         <p:spPr bwMode="auto">
           <a:xfrm>
-            <a:off x="11239500" y="3985328"/>
-            <a:ext cx="901700" cy="901700"/>
+            <a:off x="5433886" y="2626751"/>
+            <a:ext cx="6775450" cy="4225245"/>
           </a:xfrm>
           <a:prstGeom prst="rect">
             <a:avLst/>
@@ -9439,7 +9338,7 @@
     </p:spTree>
     <p:extLst>
       <p:ext uri="{BB962C8B-B14F-4D97-AF65-F5344CB8AC3E}">
-        <p14:creationId xmlns:p14="http://schemas.microsoft.com/office/powerpoint/2010/main" val="3385485801"/>
+        <p14:creationId xmlns:p14="http://schemas.microsoft.com/office/powerpoint/2010/main" val="4089780392"/>
       </p:ext>
     </p:extLst>
   </p:cSld>
@@ -9468,10 +9367,10 @@
       </p:grpSpPr>
       <p:pic>
         <p:nvPicPr>
-          <p:cNvPr id="9" name="Picture 4">
-            <a:extLst>
-              <a:ext uri="{FF2B5EF4-FFF2-40B4-BE49-F238E27FC236}">
-                <a16:creationId xmlns:a16="http://schemas.microsoft.com/office/drawing/2014/main" id="{4188B036-918C-171B-7998-5C2188B0B47E}"/>
+          <p:cNvPr id="12" name="Picture 4">
+            <a:extLst>
+              <a:ext uri="{FF2B5EF4-FFF2-40B4-BE49-F238E27FC236}">
+                <a16:creationId xmlns:a16="http://schemas.microsoft.com/office/drawing/2014/main" id="{D51FC426-3431-2E5B-DA9B-8B7F83F88E4E}"/>
               </a:ext>
             </a:extLst>
           </p:cNvPr>
@@ -9481,7 +9380,7 @@
           <p:nvPr/>
         </p:nvPicPr>
         <p:blipFill>
-          <a:blip r:embed="rId2">
+          <a:blip r:embed="rId3">
             <a:extLst>
               <a:ext uri="{28A0092B-C50C-407E-A947-70E740481C1C}">
                 <a14:useLocalDpi xmlns:a14="http://schemas.microsoft.com/office/drawing/2010/main" val="0"/>
@@ -9515,10 +9414,10 @@
       </p:pic>
       <p:sp>
         <p:nvSpPr>
-          <p:cNvPr id="3" name="Title 2">
-            <a:extLst>
-              <a:ext uri="{FF2B5EF4-FFF2-40B4-BE49-F238E27FC236}">
-                <a16:creationId xmlns:a16="http://schemas.microsoft.com/office/drawing/2014/main" id="{1D24B42B-925B-494C-A986-BD85E8117E1E}"/>
+          <p:cNvPr id="8" name="Title 7">
+            <a:extLst>
+              <a:ext uri="{FF2B5EF4-FFF2-40B4-BE49-F238E27FC236}">
+                <a16:creationId xmlns:a16="http://schemas.microsoft.com/office/drawing/2014/main" id="{103950CF-5BF2-4FB0-A36C-48C194F39E12}"/>
               </a:ext>
             </a:extLst>
           </p:cNvPr>
@@ -9531,14 +9430,12 @@
         </p:nvSpPr>
         <p:spPr>
           <a:xfrm>
-            <a:off x="5673035" y="2024690"/>
-            <a:ext cx="6299200" cy="3731529"/>
-          </a:xfrm>
-        </p:spPr>
-        <p:txBody>
-          <a:bodyPr>
-            <a:normAutofit/>
-          </a:bodyPr>
+            <a:off x="5534300" y="1150517"/>
+            <a:ext cx="5897218" cy="884238"/>
+          </a:xfrm>
+        </p:spPr>
+        <p:txBody>
+          <a:bodyPr/>
           <a:lstStyle/>
           <a:p>
             <a:r>
@@ -9547,32 +9444,65 @@
                   <a:schemeClr val="bg1"/>
                 </a:solidFill>
               </a:rPr>
-              <a:t>BUILDING </a:t>
-            </a:r>
-            <a:br>
-              <a:rPr lang="en-US" dirty="0"/>
-            </a:br>
-            <a:r>
-              <a:rPr lang="en-US" dirty="0"/>
-              <a:t>YOUR FIRST ORCHESTRATION</a:t>
-            </a:r>
-          </a:p>
-        </p:txBody>
-      </p:sp>
-      <p:sp>
-        <p:nvSpPr>
-          <p:cNvPr id="6" name="Slide Number Placeholder 5">
-            <a:extLst>
-              <a:ext uri="{FF2B5EF4-FFF2-40B4-BE49-F238E27FC236}">
-                <a16:creationId xmlns:a16="http://schemas.microsoft.com/office/drawing/2014/main" id="{FC6A5C12-E784-444E-B868-DE2AE85742BB}"/>
-              </a:ext>
-            </a:extLst>
-          </p:cNvPr>
-          <p:cNvSpPr>
-            <a:spLocks noGrp="1"/>
-          </p:cNvSpPr>
-          <p:nvPr>
-            <p:ph type="sldNum" sz="quarter" idx="12"/>
+              <a:t>INTRODUCTION</a:t>
+            </a:r>
+          </a:p>
+        </p:txBody>
+      </p:sp>
+      <p:pic>
+        <p:nvPicPr>
+          <p:cNvPr id="5" name="Picture Placeholder 4" descr="table with various people working on their laptops">
+            <a:extLst>
+              <a:ext uri="{FF2B5EF4-FFF2-40B4-BE49-F238E27FC236}">
+                <a16:creationId xmlns:a16="http://schemas.microsoft.com/office/drawing/2014/main" id="{A0280051-D7F1-4438-B815-F0FF4906D141}"/>
+              </a:ext>
+            </a:extLst>
+          </p:cNvPr>
+          <p:cNvPicPr>
+            <a:picLocks noGrp="1" noChangeAspect="1"/>
+          </p:cNvPicPr>
+          <p:nvPr>
+            <p:ph type="pic" sz="quarter" idx="14"/>
+          </p:nvPr>
+        </p:nvPicPr>
+        <p:blipFill rotWithShape="1">
+          <a:blip r:embed="rId4" cstate="email">
+            <a:extLst>
+              <a:ext uri="{BEBA8EAE-BF5A-486C-A8C5-ECC9F3942E4B}">
+                <a14:imgProps xmlns:a14="http://schemas.microsoft.com/office/drawing/2010/main">
+                  <a14:imgLayer r:embed="rId5">
+                    <a14:imgEffect>
+                      <a14:saturation sat="0"/>
+                    </a14:imgEffect>
+                  </a14:imgLayer>
+                </a14:imgProps>
+              </a:ext>
+              <a:ext uri="{28A0092B-C50C-407E-A947-70E740481C1C}">
+                <a14:useLocalDpi xmlns:a14="http://schemas.microsoft.com/office/drawing/2010/main"/>
+              </a:ext>
+            </a:extLst>
+          </a:blip>
+          <a:srcRect l="23617" r="23617"/>
+          <a:stretch/>
+        </p:blipFill>
+        <p:spPr>
+          <a:noFill/>
+        </p:spPr>
+      </p:pic>
+      <p:sp>
+        <p:nvSpPr>
+          <p:cNvPr id="4" name="Slide Number Placeholder 3">
+            <a:extLst>
+              <a:ext uri="{FF2B5EF4-FFF2-40B4-BE49-F238E27FC236}">
+                <a16:creationId xmlns:a16="http://schemas.microsoft.com/office/drawing/2014/main" id="{A4BADA18-8F0E-4249-A144-6CB8259BA65B}"/>
+              </a:ext>
+            </a:extLst>
+          </p:cNvPr>
+          <p:cNvSpPr>
+            <a:spLocks noGrp="1"/>
+          </p:cNvSpPr>
+          <p:nvPr>
+            <p:ph type="sldNum" sz="quarter" idx="4"/>
           </p:nvPr>
         </p:nvSpPr>
         <p:spPr/>
@@ -9588,45 +9518,573 @@
           </a:p>
         </p:txBody>
       </p:sp>
+      <p:sp>
+        <p:nvSpPr>
+          <p:cNvPr id="6" name="TextBox 5">
+            <a:extLst>
+              <a:ext uri="{FF2B5EF4-FFF2-40B4-BE49-F238E27FC236}">
+                <a16:creationId xmlns:a16="http://schemas.microsoft.com/office/drawing/2014/main" id="{40836CCE-2BC6-106A-0987-EB308801D680}"/>
+              </a:ext>
+            </a:extLst>
+          </p:cNvPr>
+          <p:cNvSpPr txBox="1"/>
+          <p:nvPr/>
+        </p:nvSpPr>
+        <p:spPr>
+          <a:xfrm>
+            <a:off x="5534935" y="1851875"/>
+            <a:ext cx="3870326" cy="369332"/>
+          </a:xfrm>
+          <a:prstGeom prst="rect">
+            <a:avLst/>
+          </a:prstGeom>
+          <a:noFill/>
+        </p:spPr>
+        <p:txBody>
+          <a:bodyPr wrap="square">
+            <a:spAutoFit/>
+          </a:bodyPr>
+          <a:lstStyle/>
+          <a:p>
+            <a:r>
+              <a:rPr lang="en-US" dirty="0">
+                <a:solidFill>
+                  <a:schemeClr val="bg1"/>
+                </a:solidFill>
+              </a:rPr>
+              <a:t>Example Orchestration</a:t>
+            </a:r>
+          </a:p>
+        </p:txBody>
+      </p:sp>
+      <p:sp>
+        <p:nvSpPr>
+          <p:cNvPr id="7" name="Oval 6">
+            <a:extLst>
+              <a:ext uri="{FF2B5EF4-FFF2-40B4-BE49-F238E27FC236}">
+                <a16:creationId xmlns:a16="http://schemas.microsoft.com/office/drawing/2014/main" id="{281C3990-3C33-560D-2452-938D972309C9}"/>
+              </a:ext>
+            </a:extLst>
+          </p:cNvPr>
+          <p:cNvSpPr/>
+          <p:nvPr/>
+        </p:nvSpPr>
+        <p:spPr>
+          <a:xfrm>
+            <a:off x="5750560" y="2508544"/>
+            <a:ext cx="1884680" cy="1103335"/>
+          </a:xfrm>
+          <a:prstGeom prst="ellipse">
+            <a:avLst/>
+          </a:prstGeom>
+        </p:spPr>
+        <p:style>
+          <a:lnRef idx="2">
+            <a:schemeClr val="accent1">
+              <a:shade val="15000"/>
+            </a:schemeClr>
+          </a:lnRef>
+          <a:fillRef idx="1">
+            <a:schemeClr val="accent1"/>
+          </a:fillRef>
+          <a:effectRef idx="0">
+            <a:schemeClr val="accent1"/>
+          </a:effectRef>
+          <a:fontRef idx="minor">
+            <a:schemeClr val="lt1"/>
+          </a:fontRef>
+        </p:style>
+        <p:txBody>
+          <a:bodyPr rtlCol="0" anchor="ctr"/>
+          <a:lstStyle/>
+          <a:p>
+            <a:pPr algn="ctr"/>
+            <a:r>
+              <a:rPr lang="en-US" dirty="0"/>
+              <a:t>Customer Places Pizza Order</a:t>
+            </a:r>
+          </a:p>
+        </p:txBody>
+      </p:sp>
+      <p:sp>
+        <p:nvSpPr>
+          <p:cNvPr id="10" name="Rectangle 9">
+            <a:extLst>
+              <a:ext uri="{FF2B5EF4-FFF2-40B4-BE49-F238E27FC236}">
+                <a16:creationId xmlns:a16="http://schemas.microsoft.com/office/drawing/2014/main" id="{9949F67E-4A72-5F8B-4AE8-843EB013926F}"/>
+              </a:ext>
+            </a:extLst>
+          </p:cNvPr>
+          <p:cNvSpPr/>
+          <p:nvPr/>
+        </p:nvSpPr>
+        <p:spPr>
+          <a:xfrm>
+            <a:off x="6893560" y="4112793"/>
+            <a:ext cx="1676400" cy="743687"/>
+          </a:xfrm>
+          <a:prstGeom prst="rect">
+            <a:avLst/>
+          </a:prstGeom>
+        </p:spPr>
+        <p:style>
+          <a:lnRef idx="2">
+            <a:schemeClr val="accent1">
+              <a:shade val="15000"/>
+            </a:schemeClr>
+          </a:lnRef>
+          <a:fillRef idx="1">
+            <a:schemeClr val="accent1"/>
+          </a:fillRef>
+          <a:effectRef idx="0">
+            <a:schemeClr val="accent1"/>
+          </a:effectRef>
+          <a:fontRef idx="minor">
+            <a:schemeClr val="lt1"/>
+          </a:fontRef>
+        </p:style>
+        <p:txBody>
+          <a:bodyPr rtlCol="0" anchor="ctr"/>
+          <a:lstStyle/>
+          <a:p>
+            <a:pPr algn="ctr"/>
+            <a:r>
+              <a:rPr lang="en-US" dirty="0"/>
+              <a:t>Send Order to Store</a:t>
+            </a:r>
+          </a:p>
+        </p:txBody>
+      </p:sp>
+      <p:sp>
+        <p:nvSpPr>
+          <p:cNvPr id="11" name="Rectangle 10">
+            <a:extLst>
+              <a:ext uri="{FF2B5EF4-FFF2-40B4-BE49-F238E27FC236}">
+                <a16:creationId xmlns:a16="http://schemas.microsoft.com/office/drawing/2014/main" id="{3EAF83B1-055A-0B65-042C-0331D6026500}"/>
+              </a:ext>
+            </a:extLst>
+          </p:cNvPr>
+          <p:cNvSpPr/>
+          <p:nvPr/>
+        </p:nvSpPr>
+        <p:spPr>
+          <a:xfrm>
+            <a:off x="6893560" y="5076622"/>
+            <a:ext cx="1676400" cy="743687"/>
+          </a:xfrm>
+          <a:prstGeom prst="rect">
+            <a:avLst/>
+          </a:prstGeom>
+        </p:spPr>
+        <p:style>
+          <a:lnRef idx="2">
+            <a:schemeClr val="accent1">
+              <a:shade val="15000"/>
+            </a:schemeClr>
+          </a:lnRef>
+          <a:fillRef idx="1">
+            <a:schemeClr val="accent1"/>
+          </a:fillRef>
+          <a:effectRef idx="0">
+            <a:schemeClr val="accent1"/>
+          </a:effectRef>
+          <a:fontRef idx="minor">
+            <a:schemeClr val="lt1"/>
+          </a:fontRef>
+        </p:style>
+        <p:txBody>
+          <a:bodyPr rtlCol="0" anchor="ctr"/>
+          <a:lstStyle/>
+          <a:p>
+            <a:pPr algn="ctr"/>
+            <a:r>
+              <a:rPr lang="en-US" dirty="0"/>
+              <a:t>Wait for Pizza Made</a:t>
+            </a:r>
+          </a:p>
+        </p:txBody>
+      </p:sp>
+      <p:sp>
+        <p:nvSpPr>
+          <p:cNvPr id="13" name="Rectangle 12">
+            <a:extLst>
+              <a:ext uri="{FF2B5EF4-FFF2-40B4-BE49-F238E27FC236}">
+                <a16:creationId xmlns:a16="http://schemas.microsoft.com/office/drawing/2014/main" id="{98B90BB5-B2DF-C6C4-3CFB-6E3F88ABDDC7}"/>
+              </a:ext>
+            </a:extLst>
+          </p:cNvPr>
+          <p:cNvSpPr/>
+          <p:nvPr/>
+        </p:nvSpPr>
+        <p:spPr>
+          <a:xfrm>
+            <a:off x="6893560" y="6042647"/>
+            <a:ext cx="1676400" cy="743687"/>
+          </a:xfrm>
+          <a:prstGeom prst="rect">
+            <a:avLst/>
+          </a:prstGeom>
+        </p:spPr>
+        <p:style>
+          <a:lnRef idx="2">
+            <a:schemeClr val="accent1">
+              <a:shade val="15000"/>
+            </a:schemeClr>
+          </a:lnRef>
+          <a:fillRef idx="1">
+            <a:schemeClr val="accent1"/>
+          </a:fillRef>
+          <a:effectRef idx="0">
+            <a:schemeClr val="accent1"/>
+          </a:effectRef>
+          <a:fontRef idx="minor">
+            <a:schemeClr val="lt1"/>
+          </a:fontRef>
+        </p:style>
+        <p:txBody>
+          <a:bodyPr rtlCol="0" anchor="ctr"/>
+          <a:lstStyle/>
+          <a:p>
+            <a:pPr algn="ctr"/>
+            <a:r>
+              <a:rPr lang="en-US" dirty="0"/>
+              <a:t>Send Customer Notification</a:t>
+            </a:r>
+          </a:p>
+        </p:txBody>
+      </p:sp>
       <p:pic>
         <p:nvPicPr>
-          <p:cNvPr id="8" name="Picture Placeholder 7" descr="close up of computer code">
-            <a:extLst>
-              <a:ext uri="{FF2B5EF4-FFF2-40B4-BE49-F238E27FC236}">
-                <a16:creationId xmlns:a16="http://schemas.microsoft.com/office/drawing/2014/main" id="{A596BF19-CC58-4709-B5D6-3FC378FDC7BA}"/>
+          <p:cNvPr id="15" name="Graphic 14" descr="Chef male with solid fill">
+            <a:extLst>
+              <a:ext uri="{FF2B5EF4-FFF2-40B4-BE49-F238E27FC236}">
+                <a16:creationId xmlns:a16="http://schemas.microsoft.com/office/drawing/2014/main" id="{0194B278-EB30-F77E-1B2A-DA636A67EFEA}"/>
               </a:ext>
             </a:extLst>
           </p:cNvPr>
           <p:cNvPicPr>
-            <a:picLocks noGrp="1" noChangeAspect="1"/>
+            <a:picLocks noChangeAspect="1"/>
           </p:cNvPicPr>
-          <p:nvPr>
-            <p:ph type="pic" sz="quarter" idx="13"/>
-          </p:nvPr>
+          <p:nvPr/>
         </p:nvPicPr>
-        <p:blipFill rotWithShape="1">
-          <a:blip r:embed="rId3">
-            <a:extLst>
-              <a:ext uri="{BEBA8EAE-BF5A-486C-A8C5-ECC9F3942E4B}">
-                <a14:imgProps xmlns:a14="http://schemas.microsoft.com/office/drawing/2010/main">
-                  <a14:imgLayer r:embed="rId4">
-                    <a14:imgEffect>
-                      <a14:saturation sat="0"/>
-                    </a14:imgEffect>
-                  </a14:imgLayer>
-                </a14:imgProps>
+        <p:blipFill>
+          <a:blip r:embed="rId6">
+            <a:extLst>
+              <a:ext uri="{96DAC541-7B7A-43D3-8B79-37D633B846F1}">
+                <asvg:svgBlip xmlns:asvg="http://schemas.microsoft.com/office/drawing/2016/SVG/main" r:embed="rId7"/>
               </a:ext>
             </a:extLst>
           </a:blip>
-          <a:srcRect l="20370" r="20370"/>
-          <a:stretch/>
+          <a:stretch>
+            <a:fillRect/>
+          </a:stretch>
         </p:blipFill>
-        <p:spPr/>
+        <p:spPr>
+          <a:xfrm>
+            <a:off x="10380869" y="4025825"/>
+            <a:ext cx="914400" cy="914400"/>
+          </a:xfrm>
+          <a:prstGeom prst="rect">
+            <a:avLst/>
+          </a:prstGeom>
+        </p:spPr>
+      </p:pic>
+      <p:sp>
+        <p:nvSpPr>
+          <p:cNvPr id="22" name="TextBox 21">
+            <a:extLst>
+              <a:ext uri="{FF2B5EF4-FFF2-40B4-BE49-F238E27FC236}">
+                <a16:creationId xmlns:a16="http://schemas.microsoft.com/office/drawing/2014/main" id="{71E33CF6-ABA1-8FC9-EE11-5638374C57BA}"/>
+              </a:ext>
+            </a:extLst>
+          </p:cNvPr>
+          <p:cNvSpPr txBox="1"/>
+          <p:nvPr/>
+        </p:nvSpPr>
+        <p:spPr>
+          <a:xfrm>
+            <a:off x="9098280" y="5395813"/>
+            <a:ext cx="1815369" cy="369332"/>
+          </a:xfrm>
+          <a:prstGeom prst="rect">
+            <a:avLst/>
+          </a:prstGeom>
+          <a:noFill/>
+        </p:spPr>
+        <p:txBody>
+          <a:bodyPr wrap="none" rtlCol="0">
+            <a:spAutoFit/>
+          </a:bodyPr>
+          <a:lstStyle/>
+          <a:p>
+            <a:r>
+              <a:rPr lang="en-US" dirty="0"/>
+              <a:t>Clicks Pizza Made</a:t>
+            </a:r>
+          </a:p>
+        </p:txBody>
+      </p:sp>
+      <p:cxnSp>
+        <p:nvCxnSpPr>
+          <p:cNvPr id="26" name="Connector: Elbow 25">
+            <a:extLst>
+              <a:ext uri="{FF2B5EF4-FFF2-40B4-BE49-F238E27FC236}">
+                <a16:creationId xmlns:a16="http://schemas.microsoft.com/office/drawing/2014/main" id="{8829843A-C1B0-C94B-2B10-66771B0E3BF7}"/>
+              </a:ext>
+            </a:extLst>
+          </p:cNvPr>
+          <p:cNvCxnSpPr>
+            <a:cxnSpLocks/>
+            <a:stCxn id="7" idx="4"/>
+            <a:endCxn id="10" idx="1"/>
+          </p:cNvCxnSpPr>
+          <p:nvPr/>
+        </p:nvCxnSpPr>
+        <p:spPr>
+          <a:xfrm rot="16200000" flipH="1">
+            <a:off x="6356851" y="3947928"/>
+            <a:ext cx="872758" cy="200660"/>
+          </a:xfrm>
+          <a:prstGeom prst="bentConnector2">
+            <a:avLst/>
+          </a:prstGeom>
+          <a:ln w="28575">
+            <a:tailEnd type="triangle"/>
+          </a:ln>
+        </p:spPr>
+        <p:style>
+          <a:lnRef idx="1">
+            <a:schemeClr val="accent1"/>
+          </a:lnRef>
+          <a:fillRef idx="0">
+            <a:schemeClr val="accent1"/>
+          </a:fillRef>
+          <a:effectRef idx="0">
+            <a:schemeClr val="accent1"/>
+          </a:effectRef>
+          <a:fontRef idx="minor">
+            <a:schemeClr val="tx1"/>
+          </a:fontRef>
+        </p:style>
+      </p:cxnSp>
+      <p:cxnSp>
+        <p:nvCxnSpPr>
+          <p:cNvPr id="33" name="Connector: Elbow 32">
+            <a:extLst>
+              <a:ext uri="{FF2B5EF4-FFF2-40B4-BE49-F238E27FC236}">
+                <a16:creationId xmlns:a16="http://schemas.microsoft.com/office/drawing/2014/main" id="{CF83FE70-17C6-1923-337B-2B974BCEE92E}"/>
+              </a:ext>
+            </a:extLst>
+          </p:cNvPr>
+          <p:cNvCxnSpPr>
+            <a:cxnSpLocks/>
+            <a:stCxn id="10" idx="3"/>
+          </p:cNvCxnSpPr>
+          <p:nvPr/>
+        </p:nvCxnSpPr>
+        <p:spPr>
+          <a:xfrm flipV="1">
+            <a:off x="8569960" y="4017333"/>
+            <a:ext cx="2268109" cy="467304"/>
+          </a:xfrm>
+          <a:prstGeom prst="bentConnector3">
+            <a:avLst>
+              <a:gd name="adj1" fmla="val 50000"/>
+            </a:avLst>
+          </a:prstGeom>
+          <a:ln w="28575">
+            <a:tailEnd type="triangle"/>
+          </a:ln>
+        </p:spPr>
+        <p:style>
+          <a:lnRef idx="1">
+            <a:schemeClr val="accent1"/>
+          </a:lnRef>
+          <a:fillRef idx="0">
+            <a:schemeClr val="accent1"/>
+          </a:fillRef>
+          <a:effectRef idx="0">
+            <a:schemeClr val="accent1"/>
+          </a:effectRef>
+          <a:fontRef idx="minor">
+            <a:schemeClr val="tx1"/>
+          </a:fontRef>
+        </p:style>
+      </p:cxnSp>
+      <p:cxnSp>
+        <p:nvCxnSpPr>
+          <p:cNvPr id="36" name="Connector: Elbow 35">
+            <a:extLst>
+              <a:ext uri="{FF2B5EF4-FFF2-40B4-BE49-F238E27FC236}">
+                <a16:creationId xmlns:a16="http://schemas.microsoft.com/office/drawing/2014/main" id="{7F64836B-EE0F-1D61-50B6-FC8F737566CD}"/>
+              </a:ext>
+            </a:extLst>
+          </p:cNvPr>
+          <p:cNvCxnSpPr>
+            <a:cxnSpLocks/>
+            <a:stCxn id="15" idx="2"/>
+            <a:endCxn id="11" idx="3"/>
+          </p:cNvCxnSpPr>
+          <p:nvPr/>
+        </p:nvCxnSpPr>
+        <p:spPr>
+          <a:xfrm rot="5400000">
+            <a:off x="9449895" y="4060291"/>
+            <a:ext cx="508241" cy="2268109"/>
+          </a:xfrm>
+          <a:prstGeom prst="bentConnector2">
+            <a:avLst/>
+          </a:prstGeom>
+          <a:ln w="28575">
+            <a:tailEnd type="triangle"/>
+          </a:ln>
+        </p:spPr>
+        <p:style>
+          <a:lnRef idx="1">
+            <a:schemeClr val="accent1"/>
+          </a:lnRef>
+          <a:fillRef idx="0">
+            <a:schemeClr val="accent1"/>
+          </a:fillRef>
+          <a:effectRef idx="0">
+            <a:schemeClr val="accent1"/>
+          </a:effectRef>
+          <a:fontRef idx="minor">
+            <a:schemeClr val="tx1"/>
+          </a:fontRef>
+        </p:style>
+      </p:cxnSp>
+      <p:cxnSp>
+        <p:nvCxnSpPr>
+          <p:cNvPr id="41" name="Connector: Elbow 40">
+            <a:extLst>
+              <a:ext uri="{FF2B5EF4-FFF2-40B4-BE49-F238E27FC236}">
+                <a16:creationId xmlns:a16="http://schemas.microsoft.com/office/drawing/2014/main" id="{B4FF0B41-E6A1-60C4-1142-FCD0F3D00159}"/>
+              </a:ext>
+            </a:extLst>
+          </p:cNvPr>
+          <p:cNvCxnSpPr>
+            <a:cxnSpLocks/>
+            <a:stCxn id="11" idx="2"/>
+            <a:endCxn id="13" idx="0"/>
+          </p:cNvCxnSpPr>
+          <p:nvPr/>
+        </p:nvCxnSpPr>
+        <p:spPr>
+          <a:xfrm rot="5400000">
+            <a:off x="7620591" y="5931478"/>
+            <a:ext cx="222338" cy="12700"/>
+          </a:xfrm>
+          <a:prstGeom prst="bentConnector3">
+            <a:avLst>
+              <a:gd name="adj1" fmla="val 50000"/>
+            </a:avLst>
+          </a:prstGeom>
+          <a:ln w="28575">
+            <a:tailEnd type="triangle"/>
+          </a:ln>
+        </p:spPr>
+        <p:style>
+          <a:lnRef idx="1">
+            <a:schemeClr val="accent1"/>
+          </a:lnRef>
+          <a:fillRef idx="0">
+            <a:schemeClr val="accent1"/>
+          </a:fillRef>
+          <a:effectRef idx="0">
+            <a:schemeClr val="accent1"/>
+          </a:effectRef>
+          <a:fontRef idx="minor">
+            <a:schemeClr val="tx1"/>
+          </a:fontRef>
+        </p:style>
+      </p:cxnSp>
+      <p:sp>
+        <p:nvSpPr>
+          <p:cNvPr id="44" name="TextBox 43">
+            <a:extLst>
+              <a:ext uri="{FF2B5EF4-FFF2-40B4-BE49-F238E27FC236}">
+                <a16:creationId xmlns:a16="http://schemas.microsoft.com/office/drawing/2014/main" id="{6AC151CC-5187-8977-9CB8-17EF7EE1997A}"/>
+              </a:ext>
+            </a:extLst>
+          </p:cNvPr>
+          <p:cNvSpPr txBox="1"/>
+          <p:nvPr/>
+        </p:nvSpPr>
+        <p:spPr>
+          <a:xfrm>
+            <a:off x="8620760" y="4517696"/>
+            <a:ext cx="1218539" cy="369332"/>
+          </a:xfrm>
+          <a:prstGeom prst="rect">
+            <a:avLst/>
+          </a:prstGeom>
+          <a:noFill/>
+        </p:spPr>
+        <p:txBody>
+          <a:bodyPr wrap="none" rtlCol="0">
+            <a:spAutoFit/>
+          </a:bodyPr>
+          <a:lstStyle/>
+          <a:p>
+            <a:r>
+              <a:rPr lang="en-US" dirty="0"/>
+              <a:t>Make Pizza</a:t>
+            </a:r>
+          </a:p>
+        </p:txBody>
+      </p:sp>
+      <p:pic>
+        <p:nvPicPr>
+          <p:cNvPr id="3074" name="Picture 2">
+            <a:extLst>
+              <a:ext uri="{FF2B5EF4-FFF2-40B4-BE49-F238E27FC236}">
+                <a16:creationId xmlns:a16="http://schemas.microsoft.com/office/drawing/2014/main" id="{CC34E186-7519-9F79-7839-F2EC906B981C}"/>
+              </a:ext>
+            </a:extLst>
+          </p:cNvPr>
+          <p:cNvPicPr>
+            <a:picLocks noChangeAspect="1" noChangeArrowheads="1"/>
+          </p:cNvPicPr>
+          <p:nvPr/>
+        </p:nvPicPr>
+        <p:blipFill>
+          <a:blip r:embed="rId8">
+            <a:extLst>
+              <a:ext uri="{28A0092B-C50C-407E-A947-70E740481C1C}">
+                <a14:useLocalDpi xmlns:a14="http://schemas.microsoft.com/office/drawing/2010/main" val="0"/>
+              </a:ext>
+            </a:extLst>
+          </a:blip>
+          <a:srcRect/>
+          <a:stretch>
+            <a:fillRect/>
+          </a:stretch>
+        </p:blipFill>
+        <p:spPr bwMode="auto">
+          <a:xfrm>
+            <a:off x="11239500" y="3985328"/>
+            <a:ext cx="901700" cy="901700"/>
+          </a:xfrm>
+          <a:prstGeom prst="rect">
+            <a:avLst/>
+          </a:prstGeom>
+          <a:noFill/>
+          <a:extLst>
+            <a:ext uri="{909E8E84-426E-40DD-AFC4-6F175D3DCCD1}">
+              <a14:hiddenFill xmlns:a14="http://schemas.microsoft.com/office/drawing/2010/main">
+                <a:solidFill>
+                  <a:srgbClr val="FFFFFF"/>
+                </a:solidFill>
+              </a14:hiddenFill>
+            </a:ext>
+          </a:extLst>
+        </p:spPr>
       </p:pic>
     </p:spTree>
     <p:extLst>
       <p:ext uri="{BB962C8B-B14F-4D97-AF65-F5344CB8AC3E}">
-        <p14:creationId xmlns:p14="http://schemas.microsoft.com/office/powerpoint/2010/main" val="2944765398"/>
+        <p14:creationId xmlns:p14="http://schemas.microsoft.com/office/powerpoint/2010/main" val="3385485801"/>
       </p:ext>
     </p:extLst>
   </p:cSld>
@@ -9718,13 +10176,13 @@
         </p:nvSpPr>
         <p:spPr>
           <a:xfrm>
-            <a:off x="5673035" y="1760530"/>
+            <a:off x="5673035" y="2024690"/>
             <a:ext cx="6299200" cy="3731529"/>
           </a:xfrm>
         </p:spPr>
         <p:txBody>
           <a:bodyPr>
-            <a:normAutofit fontScale="90000"/>
+            <a:normAutofit/>
           </a:bodyPr>
           <a:lstStyle/>
           <a:p>
@@ -9734,15 +10192,15 @@
                   <a:schemeClr val="bg1"/>
                 </a:solidFill>
               </a:rPr>
-              <a:t>FUNCTION CHAINING </a:t>
+              <a:t>BUILDING </a:t>
             </a:r>
             <a:br>
               <a:rPr lang="en-US" dirty="0"/>
             </a:br>
-            <a:br>
+            <a:r>
               <a:rPr lang="en-US" dirty="0"/>
-            </a:br>
-            <a:endParaRPr lang="en-US" dirty="0"/>
+              <a:t>YOUR FIRST ORCHESTRATION</a:t>
+            </a:r>
           </a:p>
         </p:txBody>
       </p:sp>
@@ -9810,40 +10268,10 @@
         </p:blipFill>
         <p:spPr/>
       </p:pic>
-      <p:pic>
-        <p:nvPicPr>
-          <p:cNvPr id="12" name="Picture 11">
-            <a:extLst>
-              <a:ext uri="{FF2B5EF4-FFF2-40B4-BE49-F238E27FC236}">
-                <a16:creationId xmlns:a16="http://schemas.microsoft.com/office/drawing/2014/main" id="{3D72E2DF-24F3-01A9-93B1-DB16589BB5A6}"/>
-              </a:ext>
-            </a:extLst>
-          </p:cNvPr>
-          <p:cNvPicPr>
-            <a:picLocks noChangeAspect="1"/>
-          </p:cNvPicPr>
-          <p:nvPr/>
-        </p:nvPicPr>
-        <p:blipFill>
-          <a:blip r:embed="rId5"/>
-          <a:stretch>
-            <a:fillRect/>
-          </a:stretch>
-        </p:blipFill>
-        <p:spPr>
-          <a:xfrm>
-            <a:off x="4942840" y="4602349"/>
-            <a:ext cx="6924040" cy="1219910"/>
-          </a:xfrm>
-          <a:prstGeom prst="rect">
-            <a:avLst/>
-          </a:prstGeom>
-        </p:spPr>
-      </p:pic>
     </p:spTree>
     <p:extLst>
       <p:ext uri="{BB962C8B-B14F-4D97-AF65-F5344CB8AC3E}">
-        <p14:creationId xmlns:p14="http://schemas.microsoft.com/office/powerpoint/2010/main" val="1219442933"/>
+        <p14:creationId xmlns:p14="http://schemas.microsoft.com/office/powerpoint/2010/main" val="2944765398"/>
       </p:ext>
     </p:extLst>
   </p:cSld>
@@ -9941,7 +10369,7 @@
         </p:spPr>
         <p:txBody>
           <a:bodyPr>
-            <a:normAutofit/>
+            <a:normAutofit fontScale="90000"/>
           </a:bodyPr>
           <a:lstStyle/>
           <a:p>
@@ -9951,7 +10379,7 @@
                   <a:schemeClr val="bg1"/>
                 </a:solidFill>
               </a:rPr>
-              <a:t>FAN OUT/FAN IN</a:t>
+              <a:t>FUNCTION CHAINING </a:t>
             </a:r>
             <a:br>
               <a:rPr lang="en-US" dirty="0"/>
@@ -10029,55 +10457,38 @@
       </p:pic>
       <p:pic>
         <p:nvPicPr>
-          <p:cNvPr id="8194" name="Picture 2" descr="A diagram of the fan out/fan pattern">
-            <a:extLst>
-              <a:ext uri="{FF2B5EF4-FFF2-40B4-BE49-F238E27FC236}">
-                <a16:creationId xmlns:a16="http://schemas.microsoft.com/office/drawing/2014/main" id="{918FF539-AA14-884E-44ED-48ED3C352A43}"/>
+          <p:cNvPr id="12" name="Picture 11">
+            <a:extLst>
+              <a:ext uri="{FF2B5EF4-FFF2-40B4-BE49-F238E27FC236}">
+                <a16:creationId xmlns:a16="http://schemas.microsoft.com/office/drawing/2014/main" id="{3D72E2DF-24F3-01A9-93B1-DB16589BB5A6}"/>
               </a:ext>
             </a:extLst>
           </p:cNvPr>
           <p:cNvPicPr>
-            <a:picLocks noChangeAspect="1" noChangeArrowheads="1"/>
+            <a:picLocks noChangeAspect="1"/>
           </p:cNvPicPr>
           <p:nvPr/>
         </p:nvPicPr>
         <p:blipFill>
-          <a:blip r:embed="rId5">
-            <a:extLst>
-              <a:ext uri="{28A0092B-C50C-407E-A947-70E740481C1C}">
-                <a14:useLocalDpi xmlns:a14="http://schemas.microsoft.com/office/drawing/2010/main" val="0"/>
-              </a:ext>
-            </a:extLst>
-          </a:blip>
-          <a:srcRect/>
+          <a:blip r:embed="rId5"/>
           <a:stretch>
             <a:fillRect/>
           </a:stretch>
         </p:blipFill>
-        <p:spPr bwMode="auto">
-          <a:xfrm>
-            <a:off x="5466398" y="4017113"/>
-            <a:ext cx="5495925" cy="2724150"/>
+        <p:spPr>
+          <a:xfrm>
+            <a:off x="4942840" y="4602349"/>
+            <a:ext cx="6924040" cy="1219910"/>
           </a:xfrm>
           <a:prstGeom prst="rect">
             <a:avLst/>
           </a:prstGeom>
-          <a:noFill/>
-          <a:extLst>
-            <a:ext uri="{909E8E84-426E-40DD-AFC4-6F175D3DCCD1}">
-              <a14:hiddenFill xmlns:a14="http://schemas.microsoft.com/office/drawing/2010/main">
-                <a:solidFill>
-                  <a:srgbClr val="FFFFFF"/>
-                </a:solidFill>
-              </a14:hiddenFill>
-            </a:ext>
-          </a:extLst>
         </p:spPr>
       </p:pic>
     </p:spTree>
     <p:extLst>
       <p:ext uri="{BB962C8B-B14F-4D97-AF65-F5344CB8AC3E}">
-        <p14:creationId xmlns:p14="http://schemas.microsoft.com/office/powerpoint/2010/main" val="1987547302"/>
+        <p14:creationId xmlns:p14="http://schemas.microsoft.com/office/powerpoint/2010/main" val="1219442933"/>
       </p:ext>
     </p:extLst>
   </p:cSld>
@@ -10973,6 +11384,15 @@
 </file>
 
 <file path=customXml/item1.xml><?xml version="1.0" encoding="utf-8"?>
+<?mso-contentType ?>
+<FormTemplates xmlns="http://schemas.microsoft.com/sharepoint/v3/contenttype/forms">
+  <Display>DocumentLibraryForm</Display>
+  <Edit>DocumentLibraryForm</Edit>
+  <New>DocumentLibraryForm</New>
+</FormTemplates>
+</file>
+
+<file path=customXml/item2.xml><?xml version="1.0" encoding="utf-8"?>
 <p:properties xmlns:p="http://schemas.microsoft.com/office/2006/metadata/properties" xmlns:xsi="http://www.w3.org/2001/XMLSchema-instance" xmlns:pc="http://schemas.microsoft.com/office/infopath/2007/PartnerControls">
   <documentManagement>
     <Status xmlns="71af3243-3dd4-4a8d-8c0d-dd76da1f02a5">Not started</Status>
@@ -10990,15 +11410,6 @@
     <TaxCatchAll xmlns="230e9df3-be65-4c73-a93b-d1236ebd677e" xsi:nil="true"/>
   </documentManagement>
 </p:properties>
-</file>
-
-<file path=customXml/item2.xml><?xml version="1.0" encoding="utf-8"?>
-<?mso-contentType ?>
-<FormTemplates xmlns="http://schemas.microsoft.com/sharepoint/v3/contenttype/forms">
-  <Display>DocumentLibraryForm</Display>
-  <Edit>DocumentLibraryForm</Edit>
-  <New>DocumentLibraryForm</New>
-</FormTemplates>
 </file>
 
 <file path=customXml/item3.xml><?xml version="1.0" encoding="utf-8"?>
@@ -11314,6 +11725,14 @@
 </file>
 
 <file path=customXml/itemProps1.xml><?xml version="1.0" encoding="utf-8"?>
+<ds:datastoreItem xmlns:ds="http://schemas.openxmlformats.org/officeDocument/2006/customXml" ds:itemID="{99E4EAC9-33DC-4CF0-BA31-C98F61CE4785}">
+  <ds:schemaRefs>
+    <ds:schemaRef ds:uri="http://schemas.microsoft.com/sharepoint/v3/contenttype/forms"/>
+  </ds:schemaRefs>
+</ds:datastoreItem>
+</file>
+
+<file path=customXml/itemProps2.xml><?xml version="1.0" encoding="utf-8"?>
 <ds:datastoreItem xmlns:ds="http://schemas.openxmlformats.org/officeDocument/2006/customXml" ds:itemID="{8002A8ED-1331-4C1D-8649-743D7BE164DD}">
   <ds:schemaRefs>
     <ds:schemaRef ds:uri="http://schemas.microsoft.com/office/2006/metadata/properties"/>
@@ -11321,14 +11740,6 @@
     <ds:schemaRef ds:uri="71af3243-3dd4-4a8d-8c0d-dd76da1f02a5"/>
     <ds:schemaRef ds:uri="http://schemas.microsoft.com/sharepoint/v3"/>
     <ds:schemaRef ds:uri="230e9df3-be65-4c73-a93b-d1236ebd677e"/>
-  </ds:schemaRefs>
-</ds:datastoreItem>
-</file>
-
-<file path=customXml/itemProps2.xml><?xml version="1.0" encoding="utf-8"?>
-<ds:datastoreItem xmlns:ds="http://schemas.openxmlformats.org/officeDocument/2006/customXml" ds:itemID="{99E4EAC9-33DC-4CF0-BA31-C98F61CE4785}">
-  <ds:schemaRefs>
-    <ds:schemaRef ds:uri="http://schemas.microsoft.com/sharepoint/v3/contenttype/forms"/>
   </ds:schemaRefs>
 </ds:datastoreItem>
 </file>

</xml_diff>